<commit_message>
precal 2 updated pptx
</commit_message>
<xml_diff>
--- a/print/Precal2_02_04.pptx
+++ b/print/Precal2_02_04.pptx
@@ -74,10 +74,10 @@
         </a:solidFill>
         <a:effectLst/>
         <a:uFillTx/>
-        <a:latin typeface="+mj-lt"/>
-        <a:ea typeface="+mj-ea"/>
-        <a:cs typeface="+mj-cs"/>
-        <a:sym typeface="Helvetica"/>
+        <a:latin typeface="+mn-lt"/>
+        <a:ea typeface="+mn-ea"/>
+        <a:cs typeface="+mn-cs"/>
+        <a:sym typeface="Arial"/>
       </a:defRPr>
     </a:lvl1pPr>
     <a:lvl2pPr marL="0" marR="0" indent="0" algn="l" defTabSz="914400" rtl="0" fontAlgn="auto" latinLnBrk="0" hangingPunct="0">
@@ -104,10 +104,10 @@
         </a:solidFill>
         <a:effectLst/>
         <a:uFillTx/>
-        <a:latin typeface="+mj-lt"/>
-        <a:ea typeface="+mj-ea"/>
-        <a:cs typeface="+mj-cs"/>
-        <a:sym typeface="Helvetica"/>
+        <a:latin typeface="+mn-lt"/>
+        <a:ea typeface="+mn-ea"/>
+        <a:cs typeface="+mn-cs"/>
+        <a:sym typeface="Arial"/>
       </a:defRPr>
     </a:lvl2pPr>
     <a:lvl3pPr marL="0" marR="0" indent="0" algn="l" defTabSz="914400" rtl="0" fontAlgn="auto" latinLnBrk="0" hangingPunct="0">
@@ -134,10 +134,10 @@
         </a:solidFill>
         <a:effectLst/>
         <a:uFillTx/>
-        <a:latin typeface="+mj-lt"/>
-        <a:ea typeface="+mj-ea"/>
-        <a:cs typeface="+mj-cs"/>
-        <a:sym typeface="Helvetica"/>
+        <a:latin typeface="+mn-lt"/>
+        <a:ea typeface="+mn-ea"/>
+        <a:cs typeface="+mn-cs"/>
+        <a:sym typeface="Arial"/>
       </a:defRPr>
     </a:lvl3pPr>
     <a:lvl4pPr marL="0" marR="0" indent="0" algn="l" defTabSz="914400" rtl="0" fontAlgn="auto" latinLnBrk="0" hangingPunct="0">
@@ -164,10 +164,10 @@
         </a:solidFill>
         <a:effectLst/>
         <a:uFillTx/>
-        <a:latin typeface="+mj-lt"/>
-        <a:ea typeface="+mj-ea"/>
-        <a:cs typeface="+mj-cs"/>
-        <a:sym typeface="Helvetica"/>
+        <a:latin typeface="+mn-lt"/>
+        <a:ea typeface="+mn-ea"/>
+        <a:cs typeface="+mn-cs"/>
+        <a:sym typeface="Arial"/>
       </a:defRPr>
     </a:lvl4pPr>
     <a:lvl5pPr marL="0" marR="0" indent="0" algn="l" defTabSz="914400" rtl="0" fontAlgn="auto" latinLnBrk="0" hangingPunct="0">
@@ -194,10 +194,10 @@
         </a:solidFill>
         <a:effectLst/>
         <a:uFillTx/>
-        <a:latin typeface="+mj-lt"/>
-        <a:ea typeface="+mj-ea"/>
-        <a:cs typeface="+mj-cs"/>
-        <a:sym typeface="Helvetica"/>
+        <a:latin typeface="+mn-lt"/>
+        <a:ea typeface="+mn-ea"/>
+        <a:cs typeface="+mn-cs"/>
+        <a:sym typeface="Arial"/>
       </a:defRPr>
     </a:lvl5pPr>
     <a:lvl6pPr marL="0" marR="0" indent="0" algn="l" defTabSz="914400" rtl="0" fontAlgn="auto" latinLnBrk="0" hangingPunct="0">
@@ -224,10 +224,10 @@
         </a:solidFill>
         <a:effectLst/>
         <a:uFillTx/>
-        <a:latin typeface="+mj-lt"/>
-        <a:ea typeface="+mj-ea"/>
-        <a:cs typeface="+mj-cs"/>
-        <a:sym typeface="Helvetica"/>
+        <a:latin typeface="+mn-lt"/>
+        <a:ea typeface="+mn-ea"/>
+        <a:cs typeface="+mn-cs"/>
+        <a:sym typeface="Arial"/>
       </a:defRPr>
     </a:lvl6pPr>
     <a:lvl7pPr marL="0" marR="0" indent="0" algn="l" defTabSz="914400" rtl="0" fontAlgn="auto" latinLnBrk="0" hangingPunct="0">
@@ -254,10 +254,10 @@
         </a:solidFill>
         <a:effectLst/>
         <a:uFillTx/>
-        <a:latin typeface="+mj-lt"/>
-        <a:ea typeface="+mj-ea"/>
-        <a:cs typeface="+mj-cs"/>
-        <a:sym typeface="Helvetica"/>
+        <a:latin typeface="+mn-lt"/>
+        <a:ea typeface="+mn-ea"/>
+        <a:cs typeface="+mn-cs"/>
+        <a:sym typeface="Arial"/>
       </a:defRPr>
     </a:lvl7pPr>
     <a:lvl8pPr marL="0" marR="0" indent="0" algn="l" defTabSz="914400" rtl="0" fontAlgn="auto" latinLnBrk="0" hangingPunct="0">
@@ -284,10 +284,10 @@
         </a:solidFill>
         <a:effectLst/>
         <a:uFillTx/>
-        <a:latin typeface="+mj-lt"/>
-        <a:ea typeface="+mj-ea"/>
-        <a:cs typeface="+mj-cs"/>
-        <a:sym typeface="Helvetica"/>
+        <a:latin typeface="+mn-lt"/>
+        <a:ea typeface="+mn-ea"/>
+        <a:cs typeface="+mn-cs"/>
+        <a:sym typeface="Arial"/>
       </a:defRPr>
     </a:lvl8pPr>
     <a:lvl9pPr marL="0" marR="0" indent="0" algn="l" defTabSz="914400" rtl="0" fontAlgn="auto" latinLnBrk="0" hangingPunct="0">
@@ -314,10 +314,10 @@
         </a:solidFill>
         <a:effectLst/>
         <a:uFillTx/>
-        <a:latin typeface="+mj-lt"/>
-        <a:ea typeface="+mj-ea"/>
-        <a:cs typeface="+mj-cs"/>
-        <a:sym typeface="Helvetica"/>
+        <a:latin typeface="+mn-lt"/>
+        <a:ea typeface="+mn-ea"/>
+        <a:cs typeface="+mn-cs"/>
+        <a:sym typeface="Arial"/>
       </a:defRPr>
     </a:lvl9pPr>
   </p:defaultTextStyle>
@@ -530,7 +530,7 @@
           <a:bodyPr/>
           <a:lstStyle/>
           <a:p>
-            <a:pPr marL="187157" indent="-187157">
+            <a:pPr marL="187156" indent="-187156">
               <a:buSzPct val="100000"/>
               <a:buAutoNum type="arabicPeriod" startAt="1"/>
             </a:pPr>
@@ -539,7 +539,7 @@
             </a:r>
           </a:p>
           <a:p>
-            <a:pPr marL="187157" indent="-187157">
+            <a:pPr marL="187156" indent="-187156">
               <a:buSzPct val="100000"/>
               <a:buAutoNum type="arabicPeriod" startAt="1"/>
             </a:pPr>
@@ -576,7 +576,7 @@
       </p:grpSpPr>
       <p:sp>
         <p:nvSpPr>
-          <p:cNvPr id="217" name="Shape 217"/>
+          <p:cNvPr id="221" name="Shape 221"/>
           <p:cNvSpPr/>
           <p:nvPr>
             <p:ph type="sldImg"/>
@@ -597,7 +597,7 @@
       </p:sp>
       <p:sp>
         <p:nvSpPr>
-          <p:cNvPr id="218" name="Shape 218"/>
+          <p:cNvPr id="222" name="Shape 222"/>
           <p:cNvSpPr/>
           <p:nvPr>
             <p:ph type="body" sz="quarter" idx="1"/>
@@ -664,7 +664,7 @@
       </p:grpSpPr>
       <p:sp>
         <p:nvSpPr>
-          <p:cNvPr id="227" name="Shape 227"/>
+          <p:cNvPr id="231" name="Shape 231"/>
           <p:cNvSpPr/>
           <p:nvPr>
             <p:ph type="sldImg"/>
@@ -685,7 +685,7 @@
       </p:sp>
       <p:sp>
         <p:nvSpPr>
-          <p:cNvPr id="228" name="Shape 228"/>
+          <p:cNvPr id="232" name="Shape 232"/>
           <p:cNvSpPr/>
           <p:nvPr>
             <p:ph type="body" sz="quarter" idx="1"/>
@@ -734,7 +734,7 @@
       </p:grpSpPr>
       <p:sp>
         <p:nvSpPr>
-          <p:cNvPr id="247" name="Shape 247"/>
+          <p:cNvPr id="251" name="Shape 251"/>
           <p:cNvSpPr/>
           <p:nvPr>
             <p:ph type="sldImg"/>
@@ -755,7 +755,7 @@
       </p:sp>
       <p:sp>
         <p:nvSpPr>
-          <p:cNvPr id="248" name="Shape 248"/>
+          <p:cNvPr id="252" name="Shape 252"/>
           <p:cNvSpPr/>
           <p:nvPr>
             <p:ph type="body" sz="quarter" idx="1"/>
@@ -847,7 +847,7 @@
         <p:spPr>
           <a:xfrm>
             <a:off x="2477722" y="415650"/>
-            <a:ext cx="6244203" cy="1"/>
+            <a:ext cx="6244204" cy="2"/>
           </a:xfrm>
           <a:prstGeom prst="line">
             <a:avLst/>
@@ -875,7 +875,7 @@
         <p:spPr>
           <a:xfrm>
             <a:off x="2477722" y="4739999"/>
-            <a:ext cx="6244203" cy="1"/>
+            <a:ext cx="6244204" cy="2"/>
           </a:xfrm>
           <a:prstGeom prst="line">
             <a:avLst/>
@@ -903,7 +903,7 @@
         <p:spPr>
           <a:xfrm>
             <a:off x="425197" y="415650"/>
-            <a:ext cx="183302" cy="1"/>
+            <a:ext cx="183303" cy="2"/>
           </a:xfrm>
           <a:prstGeom prst="line">
             <a:avLst/>
@@ -982,7 +982,7 @@
         <p:txBody>
           <a:bodyPr anchor="b"/>
           <a:lstStyle>
-            <a:lvl1pPr marL="228600" indent="-114300" algn="l">
+            <a:lvl1pPr marL="114300" indent="0" algn="l">
               <a:lnSpc>
                 <a:spcPct val="100000"/>
               </a:lnSpc>
@@ -996,7 +996,7 @@
                 </a:solidFill>
               </a:defRPr>
             </a:lvl1pPr>
-            <a:lvl2pPr marL="228600" indent="114300" algn="l">
+            <a:lvl2pPr marL="114300" indent="114300" algn="l">
               <a:lnSpc>
                 <a:spcPct val="100000"/>
               </a:lnSpc>
@@ -1010,7 +1010,7 @@
                 </a:solidFill>
               </a:defRPr>
             </a:lvl2pPr>
-            <a:lvl3pPr marL="228600" indent="114300" algn="l">
+            <a:lvl3pPr marL="114300" indent="114300" algn="l">
               <a:lnSpc>
                 <a:spcPct val="100000"/>
               </a:lnSpc>
@@ -1024,7 +1024,7 @@
                 </a:solidFill>
               </a:defRPr>
             </a:lvl3pPr>
-            <a:lvl4pPr marL="228600" indent="114300" algn="l">
+            <a:lvl4pPr marL="114300" indent="114300" algn="l">
               <a:lnSpc>
                 <a:spcPct val="100000"/>
               </a:lnSpc>
@@ -1038,7 +1038,7 @@
                 </a:solidFill>
               </a:defRPr>
             </a:lvl4pPr>
-            <a:lvl5pPr marL="228600" indent="114300" algn="l">
+            <a:lvl5pPr marL="114300" indent="114300" algn="l">
               <a:lnSpc>
                 <a:spcPct val="100000"/>
               </a:lnSpc>
@@ -1405,7 +1405,7 @@
         <p:spPr>
           <a:xfrm>
             <a:off x="2477722" y="415650"/>
-            <a:ext cx="6244203" cy="1"/>
+            <a:ext cx="6244204" cy="2"/>
           </a:xfrm>
           <a:prstGeom prst="line">
             <a:avLst/>
@@ -1420,14 +1420,7 @@
           <a:bodyPr lIns="45718" tIns="45718" rIns="45718" bIns="45718"/>
           <a:lstStyle/>
           <a:p>
-            <a:pPr>
-              <a:defRPr>
-                <a:latin typeface="+mn-lt"/>
-                <a:ea typeface="+mn-ea"/>
-                <a:cs typeface="+mn-cs"/>
-                <a:sym typeface="Arial"/>
-              </a:defRPr>
-            </a:pPr>
+            <a:pPr/>
           </a:p>
         </p:txBody>
       </p:sp>
@@ -1440,7 +1433,7 @@
         <p:spPr>
           <a:xfrm>
             <a:off x="2477722" y="4739999"/>
-            <a:ext cx="6244203" cy="1"/>
+            <a:ext cx="6244204" cy="2"/>
           </a:xfrm>
           <a:prstGeom prst="line">
             <a:avLst/>
@@ -1455,14 +1448,7 @@
           <a:bodyPr lIns="45718" tIns="45718" rIns="45718" bIns="45718"/>
           <a:lstStyle/>
           <a:p>
-            <a:pPr>
-              <a:defRPr>
-                <a:latin typeface="+mn-lt"/>
-                <a:ea typeface="+mn-ea"/>
-                <a:cs typeface="+mn-cs"/>
-                <a:sym typeface="Arial"/>
-              </a:defRPr>
-            </a:pPr>
+            <a:pPr/>
           </a:p>
         </p:txBody>
       </p:sp>
@@ -1475,7 +1461,7 @@
         <p:spPr>
           <a:xfrm>
             <a:off x="425197" y="415650"/>
-            <a:ext cx="183303" cy="1"/>
+            <a:ext cx="183304" cy="2"/>
           </a:xfrm>
           <a:prstGeom prst="line">
             <a:avLst/>
@@ -1490,14 +1476,7 @@
           <a:bodyPr lIns="45718" tIns="45718" rIns="45718" bIns="45718"/>
           <a:lstStyle/>
           <a:p>
-            <a:pPr>
-              <a:defRPr>
-                <a:latin typeface="+mn-lt"/>
-                <a:ea typeface="+mn-ea"/>
-                <a:cs typeface="+mn-cs"/>
-                <a:sym typeface="Arial"/>
-              </a:defRPr>
-            </a:pPr>
+            <a:pPr/>
           </a:p>
         </p:txBody>
       </p:sp>
@@ -1519,7 +1498,7 @@
           </a:prstGeom>
         </p:spPr>
         <p:txBody>
-          <a:bodyPr lIns="91422" tIns="91422" rIns="91422" bIns="91422" anchor="t"/>
+          <a:bodyPr lIns="91421" tIns="91421" rIns="91421" bIns="91421" anchor="t"/>
           <a:lstStyle>
             <a:lvl1pPr algn="l">
               <a:defRPr sz="3000">
@@ -1552,17 +1531,17 @@
         <p:spPr>
           <a:xfrm>
             <a:off x="2410111" y="1595776"/>
-            <a:ext cx="6321603" cy="3002403"/>
+            <a:ext cx="6321603" cy="3002404"/>
           </a:xfrm>
           <a:prstGeom prst="rect">
             <a:avLst/>
           </a:prstGeom>
         </p:spPr>
         <p:txBody>
-          <a:bodyPr lIns="91422" tIns="91422" rIns="91422" bIns="91422"/>
+          <a:bodyPr lIns="91421" tIns="91421" rIns="91421" bIns="91421"/>
           <a:lstStyle>
             <a:lvl1pPr algn="l"/>
-            <a:lvl2pPr indent="-408213" algn="l"/>
+            <a:lvl2pPr algn="l"/>
             <a:lvl3pPr algn="l"/>
             <a:lvl4pPr algn="l"/>
             <a:lvl5pPr algn="l"/>
@@ -1608,7 +1587,7 @@
         <p:spPr>
           <a:xfrm>
             <a:off x="169150" y="4739999"/>
-            <a:ext cx="8552700" cy="398747"/>
+            <a:ext cx="8552700" cy="398745"/>
           </a:xfrm>
           <a:prstGeom prst="rect">
             <a:avLst/>
@@ -1623,7 +1602,7 @@
           </a:extLst>
         </p:spPr>
         <p:txBody>
-          <a:bodyPr lIns="91422" tIns="91422" rIns="91422" bIns="91422">
+          <a:bodyPr lIns="91421" tIns="91421" rIns="91421" bIns="91421">
             <a:spAutoFit/>
           </a:bodyPr>
           <a:lstStyle/>
@@ -1664,8 +1643,8 @@
         </p:nvSpPr>
         <p:spPr>
           <a:xfrm>
-            <a:off x="7263947" y="6563"/>
-            <a:ext cx="5621103" cy="398747"/>
+            <a:off x="7263947" y="6562"/>
+            <a:ext cx="5621104" cy="398745"/>
           </a:xfrm>
           <a:prstGeom prst="rect">
             <a:avLst/>
@@ -1680,7 +1659,7 @@
           </a:extLst>
         </p:spPr>
         <p:txBody>
-          <a:bodyPr lIns="91422" tIns="91422" rIns="91422" bIns="91422">
+          <a:bodyPr lIns="91421" tIns="91421" rIns="91421" bIns="91421">
             <a:spAutoFit/>
           </a:bodyPr>
           <a:lstStyle>
@@ -1714,15 +1693,15 @@
         </p:nvSpPr>
         <p:spPr>
           <a:xfrm>
-            <a:off x="8709890" y="4717936"/>
-            <a:ext cx="336809" cy="335247"/>
+            <a:off x="8709892" y="4717937"/>
+            <a:ext cx="336808" cy="335245"/>
           </a:xfrm>
           <a:prstGeom prst="rect">
             <a:avLst/>
           </a:prstGeom>
         </p:spPr>
         <p:txBody>
-          <a:bodyPr lIns="91422" tIns="91422" rIns="91422" bIns="91422"/>
+          <a:bodyPr lIns="91421" tIns="91421" rIns="91421" bIns="91421"/>
           <a:lstStyle/>
           <a:p>
             <a:pPr/>
@@ -1793,8 +1772,8 @@
         </p:nvSpPr>
         <p:spPr>
           <a:xfrm>
-            <a:off x="2477722" y="415649"/>
-            <a:ext cx="6244203" cy="4"/>
+            <a:off x="2477722" y="415648"/>
+            <a:ext cx="6244204" cy="5"/>
           </a:xfrm>
           <a:prstGeom prst="line">
             <a:avLst/>
@@ -1809,14 +1788,7 @@
           <a:bodyPr lIns="45718" tIns="45718" rIns="45718" bIns="45718"/>
           <a:lstStyle/>
           <a:p>
-            <a:pPr>
-              <a:defRPr>
-                <a:latin typeface="+mn-lt"/>
-                <a:ea typeface="+mn-ea"/>
-                <a:cs typeface="+mn-cs"/>
-                <a:sym typeface="Arial"/>
-              </a:defRPr>
-            </a:pPr>
+            <a:pPr/>
           </a:p>
         </p:txBody>
       </p:sp>
@@ -1828,8 +1800,8 @@
         </p:nvSpPr>
         <p:spPr>
           <a:xfrm>
-            <a:off x="2477722" y="4739998"/>
-            <a:ext cx="6244203" cy="4"/>
+            <a:off x="2477722" y="4739997"/>
+            <a:ext cx="6244204" cy="5"/>
           </a:xfrm>
           <a:prstGeom prst="line">
             <a:avLst/>
@@ -1844,14 +1816,7 @@
           <a:bodyPr lIns="45718" tIns="45718" rIns="45718" bIns="45718"/>
           <a:lstStyle/>
           <a:p>
-            <a:pPr>
-              <a:defRPr>
-                <a:latin typeface="+mn-lt"/>
-                <a:ea typeface="+mn-ea"/>
-                <a:cs typeface="+mn-cs"/>
-                <a:sym typeface="Arial"/>
-              </a:defRPr>
-            </a:pPr>
+            <a:pPr/>
           </a:p>
         </p:txBody>
       </p:sp>
@@ -1864,7 +1829,7 @@
         <p:spPr>
           <a:xfrm>
             <a:off x="425197" y="415650"/>
-            <a:ext cx="183304" cy="4"/>
+            <a:ext cx="183305" cy="5"/>
           </a:xfrm>
           <a:prstGeom prst="line">
             <a:avLst/>
@@ -1879,14 +1844,7 @@
           <a:bodyPr lIns="45718" tIns="45718" rIns="45718" bIns="45718"/>
           <a:lstStyle/>
           <a:p>
-            <a:pPr>
-              <a:defRPr>
-                <a:latin typeface="+mn-lt"/>
-                <a:ea typeface="+mn-ea"/>
-                <a:cs typeface="+mn-cs"/>
-                <a:sym typeface="Arial"/>
-              </a:defRPr>
-            </a:pPr>
+            <a:pPr/>
           </a:p>
         </p:txBody>
       </p:sp>
@@ -1951,7 +1909,7 @@
           <a:bodyPr lIns="91421" tIns="91421" rIns="91421" bIns="91421"/>
           <a:lstStyle>
             <a:lvl1pPr algn="l"/>
-            <a:lvl2pPr indent="-408213" algn="l"/>
+            <a:lvl2pPr algn="l"/>
             <a:lvl3pPr algn="l"/>
             <a:lvl4pPr algn="l"/>
             <a:lvl5pPr algn="l"/>
@@ -2015,7 +1973,16 @@
           <a:bodyPr wrap="none" lIns="0" tIns="0" rIns="0" bIns="0">
             <a:spAutoFit/>
           </a:bodyPr>
-          <a:lstStyle/>
+          <a:lstStyle>
+            <a:lvl1pPr>
+              <a:defRPr>
+                <a:latin typeface="+mj-lt"/>
+                <a:ea typeface="+mj-ea"/>
+                <a:cs typeface="+mj-cs"/>
+                <a:sym typeface="Helvetica"/>
+              </a:defRPr>
+            </a:lvl1pPr>
+          </a:lstStyle>
           <a:p>
             <a:pPr/>
             <a:r>
@@ -2034,8 +2001,8 @@
         </p:nvSpPr>
         <p:spPr>
           <a:xfrm>
-            <a:off x="8709893" y="4717937"/>
-            <a:ext cx="336807" cy="335245"/>
+            <a:off x="8709895" y="4717938"/>
+            <a:ext cx="336806" cy="335243"/>
           </a:xfrm>
           <a:prstGeom prst="rect">
             <a:avLst/>
@@ -2114,7 +2081,7 @@
         <p:spPr>
           <a:xfrm>
             <a:off x="2477722" y="415650"/>
-            <a:ext cx="6244203" cy="1"/>
+            <a:ext cx="6244204" cy="2"/>
           </a:xfrm>
           <a:prstGeom prst="line">
             <a:avLst/>
@@ -2142,7 +2109,7 @@
         <p:spPr>
           <a:xfrm>
             <a:off x="2477722" y="4739999"/>
-            <a:ext cx="6244203" cy="1"/>
+            <a:ext cx="6244204" cy="2"/>
           </a:xfrm>
           <a:prstGeom prst="line">
             <a:avLst/>
@@ -2170,7 +2137,7 @@
         <p:spPr>
           <a:xfrm>
             <a:off x="425197" y="415650"/>
-            <a:ext cx="183302" cy="1"/>
+            <a:ext cx="183303" cy="2"/>
           </a:xfrm>
           <a:prstGeom prst="line">
             <a:avLst/>
@@ -2200,7 +2167,7 @@
         <p:spPr>
           <a:xfrm>
             <a:off x="2400250" y="575950"/>
-            <a:ext cx="6321601" cy="635402"/>
+            <a:ext cx="6321601" cy="635403"/>
           </a:xfrm>
           <a:prstGeom prst="rect">
             <a:avLst/>
@@ -2240,7 +2207,7 @@
         <p:spPr>
           <a:xfrm>
             <a:off x="2410111" y="1595776"/>
-            <a:ext cx="6321603" cy="3002402"/>
+            <a:ext cx="6321603" cy="3002403"/>
           </a:xfrm>
           <a:prstGeom prst="rect">
             <a:avLst/>
@@ -2295,8 +2262,8 @@
         </p:nvSpPr>
         <p:spPr>
           <a:xfrm>
-            <a:off x="159380" y="4629606"/>
-            <a:ext cx="8552701" cy="398749"/>
+            <a:off x="159379" y="4629606"/>
+            <a:ext cx="8552703" cy="398747"/>
           </a:xfrm>
           <a:prstGeom prst="rect">
             <a:avLst/>
@@ -2311,7 +2278,7 @@
           </a:extLst>
         </p:spPr>
         <p:txBody>
-          <a:bodyPr lIns="91423" tIns="91423" rIns="91423" bIns="91423">
+          <a:bodyPr lIns="91422" tIns="91422" rIns="91422" bIns="91422">
             <a:spAutoFit/>
           </a:bodyPr>
           <a:lstStyle/>
@@ -2332,17 +2299,10 @@
             </a:r>
             <a:r>
               <a:rPr b="0"/>
-              <a:t>AP CS A</a:t>
-            </a:r>
-            <a:r>
-              <a:rPr b="0"/>
-              <a:t> </a:t>
-            </a:r>
-            <a:r>
-              <a:t>g</a:t>
-            </a:r>
-            <a:r>
-              <a:t>oal: </a:t>
+              <a:t>AP CS A </a:t>
+            </a:r>
+            <a:r>
+              <a:t>goal: </a:t>
             </a:r>
             <a:r>
               <a:rPr b="0"/>
@@ -2360,7 +2320,7 @@
         <p:spPr>
           <a:xfrm>
             <a:off x="7263947" y="6563"/>
-            <a:ext cx="5621102" cy="398748"/>
+            <a:ext cx="5621103" cy="398746"/>
           </a:xfrm>
           <a:prstGeom prst="rect">
             <a:avLst/>
@@ -2375,7 +2335,7 @@
           </a:extLst>
         </p:spPr>
         <p:txBody>
-          <a:bodyPr lIns="91423" tIns="91423" rIns="91423" bIns="91423">
+          <a:bodyPr lIns="91422" tIns="91422" rIns="91422" bIns="91422">
             <a:spAutoFit/>
           </a:bodyPr>
           <a:lstStyle>
@@ -2492,7 +2452,7 @@
         <p:spPr>
           <a:xfrm>
             <a:off x="425200" y="415650"/>
-            <a:ext cx="8296800" cy="1"/>
+            <a:ext cx="8296801" cy="2"/>
           </a:xfrm>
           <a:prstGeom prst="line">
             <a:avLst/>
@@ -2520,7 +2480,7 @@
         <p:spPr>
           <a:xfrm>
             <a:off x="425200" y="4739999"/>
-            <a:ext cx="8296800" cy="1"/>
+            <a:ext cx="8296801" cy="2"/>
           </a:xfrm>
           <a:prstGeom prst="line">
             <a:avLst/>
@@ -2550,7 +2510,7 @@
         <p:spPr>
           <a:xfrm>
             <a:off x="406423" y="1806824"/>
-            <a:ext cx="8296803" cy="1542002"/>
+            <a:ext cx="8296803" cy="1542003"/>
           </a:xfrm>
           <a:prstGeom prst="rect">
             <a:avLst/>
@@ -2644,7 +2604,7 @@
         <p:spPr>
           <a:xfrm>
             <a:off x="2477722" y="415650"/>
-            <a:ext cx="6244203" cy="1"/>
+            <a:ext cx="6244204" cy="2"/>
           </a:xfrm>
           <a:prstGeom prst="line">
             <a:avLst/>
@@ -2672,7 +2632,7 @@
         <p:spPr>
           <a:xfrm>
             <a:off x="2477722" y="4739999"/>
-            <a:ext cx="6244203" cy="1"/>
+            <a:ext cx="6244204" cy="2"/>
           </a:xfrm>
           <a:prstGeom prst="line">
             <a:avLst/>
@@ -2700,7 +2660,7 @@
         <p:spPr>
           <a:xfrm>
             <a:off x="425197" y="415650"/>
-            <a:ext cx="183302" cy="1"/>
+            <a:ext cx="183303" cy="2"/>
           </a:xfrm>
           <a:prstGeom prst="line">
             <a:avLst/>
@@ -2730,7 +2690,7 @@
         <p:spPr>
           <a:xfrm>
             <a:off x="2400250" y="575950"/>
-            <a:ext cx="6321601" cy="635402"/>
+            <a:ext cx="6321601" cy="635403"/>
           </a:xfrm>
           <a:prstGeom prst="rect">
             <a:avLst/>
@@ -2770,7 +2730,7 @@
         <p:spPr>
           <a:xfrm>
             <a:off x="2410111" y="1595776"/>
-            <a:ext cx="6321603" cy="3002402"/>
+            <a:ext cx="6321603" cy="3002403"/>
           </a:xfrm>
           <a:prstGeom prst="rect">
             <a:avLst/>
@@ -2825,8 +2785,8 @@
         </p:nvSpPr>
         <p:spPr>
           <a:xfrm>
-            <a:off x="159380" y="4629606"/>
-            <a:ext cx="8552701" cy="398749"/>
+            <a:off x="159379" y="4629606"/>
+            <a:ext cx="8552703" cy="398747"/>
           </a:xfrm>
           <a:prstGeom prst="rect">
             <a:avLst/>
@@ -2841,7 +2801,7 @@
           </a:extLst>
         </p:spPr>
         <p:txBody>
-          <a:bodyPr lIns="91423" tIns="91423" rIns="91423" bIns="91423">
+          <a:bodyPr lIns="91422" tIns="91422" rIns="91422" bIns="91422">
             <a:spAutoFit/>
           </a:bodyPr>
           <a:lstStyle/>
@@ -2865,10 +2825,7 @@
               <a:t>precalc </a:t>
             </a:r>
             <a:r>
-              <a:t>g</a:t>
-            </a:r>
-            <a:r>
-              <a:t>oal: </a:t>
+              <a:t>goal: </a:t>
             </a:r>
             <a:r>
               <a:rPr b="0"/>
@@ -2886,7 +2843,7 @@
         <p:spPr>
           <a:xfrm>
             <a:off x="6731910" y="39450"/>
-            <a:ext cx="2095054" cy="215901"/>
+            <a:ext cx="2095053" cy="215901"/>
           </a:xfrm>
           <a:prstGeom prst="rect">
             <a:avLst/>
@@ -2904,7 +2861,16 @@
           <a:bodyPr lIns="0" tIns="0" rIns="0" bIns="0">
             <a:spAutoFit/>
           </a:bodyPr>
-          <a:lstStyle/>
+          <a:lstStyle>
+            <a:lvl1pPr>
+              <a:defRPr>
+                <a:latin typeface="+mj-lt"/>
+                <a:ea typeface="+mj-ea"/>
+                <a:cs typeface="+mj-cs"/>
+                <a:sym typeface="Helvetica"/>
+              </a:defRPr>
+            </a:lvl1pPr>
+          </a:lstStyle>
           <a:p>
             <a:pPr/>
             <a:r>
@@ -3028,7 +2994,7 @@
         <p:spPr>
           <a:xfrm>
             <a:off x="2477722" y="415650"/>
-            <a:ext cx="6244203" cy="1"/>
+            <a:ext cx="6244204" cy="2"/>
           </a:xfrm>
           <a:prstGeom prst="line">
             <a:avLst/>
@@ -3056,7 +3022,7 @@
         <p:spPr>
           <a:xfrm>
             <a:off x="2477722" y="4739999"/>
-            <a:ext cx="6244203" cy="1"/>
+            <a:ext cx="6244204" cy="2"/>
           </a:xfrm>
           <a:prstGeom prst="line">
             <a:avLst/>
@@ -3084,7 +3050,7 @@
         <p:spPr>
           <a:xfrm>
             <a:off x="425197" y="415650"/>
-            <a:ext cx="183302" cy="1"/>
+            <a:ext cx="183303" cy="2"/>
           </a:xfrm>
           <a:prstGeom prst="line">
             <a:avLst/>
@@ -3114,7 +3080,7 @@
         <p:spPr>
           <a:xfrm>
             <a:off x="2400250" y="575950"/>
-            <a:ext cx="6321601" cy="635402"/>
+            <a:ext cx="6321601" cy="635403"/>
           </a:xfrm>
           <a:prstGeom prst="rect">
             <a:avLst/>
@@ -3153,8 +3119,8 @@
         </p:nvSpPr>
         <p:spPr>
           <a:xfrm>
-            <a:off x="2400301" y="1602675"/>
-            <a:ext cx="3071403" cy="3002402"/>
+            <a:off x="2400300" y="1602675"/>
+            <a:ext cx="3071404" cy="3002403"/>
           </a:xfrm>
           <a:prstGeom prst="rect">
             <a:avLst/>
@@ -3227,7 +3193,7 @@
         <p:spPr>
           <a:xfrm>
             <a:off x="5650572" y="1602675"/>
-            <a:ext cx="3071402" cy="3002402"/>
+            <a:ext cx="3071403" cy="3002403"/>
           </a:xfrm>
           <a:prstGeom prst="rect">
             <a:avLst/>
@@ -3237,7 +3203,7 @@
           <a:bodyPr/>
           <a:lstStyle/>
           <a:p>
-            <a:pPr algn="l"/>
+            <a:pPr/>
           </a:p>
         </p:txBody>
       </p:sp>
@@ -3329,7 +3295,7 @@
         <p:spPr>
           <a:xfrm>
             <a:off x="303299" y="411575"/>
-            <a:ext cx="8520602" cy="639602"/>
+            <a:ext cx="8520602" cy="639603"/>
           </a:xfrm>
           <a:prstGeom prst="rect">
             <a:avLst/>
@@ -3444,7 +3410,7 @@
         <p:spPr>
           <a:xfrm>
             <a:off x="425197" y="415650"/>
-            <a:ext cx="183302" cy="1"/>
+            <a:ext cx="183303" cy="2"/>
           </a:xfrm>
           <a:prstGeom prst="line">
             <a:avLst/>
@@ -3474,7 +3440,7 @@
         <p:spPr>
           <a:xfrm>
             <a:off x="319499" y="936600"/>
-            <a:ext cx="2808002" cy="755700"/>
+            <a:ext cx="2808003" cy="755700"/>
           </a:xfrm>
           <a:prstGeom prst="rect">
             <a:avLst/>
@@ -3514,7 +3480,7 @@
         <p:spPr>
           <a:xfrm>
             <a:off x="319499" y="1846802"/>
-            <a:ext cx="2808002" cy="2806202"/>
+            <a:ext cx="2808003" cy="2806202"/>
           </a:xfrm>
           <a:prstGeom prst="rect">
             <a:avLst/>
@@ -3669,7 +3635,7 @@
         <p:spPr>
           <a:xfrm>
             <a:off x="425197" y="415650"/>
-            <a:ext cx="183302" cy="1"/>
+            <a:ext cx="183303" cy="2"/>
           </a:xfrm>
           <a:prstGeom prst="line">
             <a:avLst/>
@@ -3821,8 +3787,8 @@
         </p:nvSpPr>
         <p:spPr>
           <a:xfrm>
-            <a:off x="4572000" y="123"/>
-            <a:ext cx="4572000" cy="5143503"/>
+            <a:off x="4572000" y="122"/>
+            <a:ext cx="4572000" cy="5143505"/>
           </a:xfrm>
           <a:prstGeom prst="rect">
             <a:avLst/>
@@ -3843,10 +3809,6 @@
                 <a:solidFill>
                   <a:srgbClr val="000000"/>
                 </a:solidFill>
-                <a:latin typeface="+mn-lt"/>
-                <a:ea typeface="+mn-ea"/>
-                <a:cs typeface="+mn-cs"/>
-                <a:sym typeface="Arial"/>
               </a:defRPr>
             </a:pPr>
           </a:p>
@@ -3860,8 +3822,8 @@
         </p:nvSpPr>
         <p:spPr>
           <a:xfrm>
-            <a:off x="5029675" y="4495499"/>
-            <a:ext cx="468302" cy="2"/>
+            <a:off x="5029675" y="4495498"/>
+            <a:ext cx="468303" cy="3"/>
           </a:xfrm>
           <a:prstGeom prst="line">
             <a:avLst/>
@@ -3891,7 +3853,7 @@
         <p:spPr>
           <a:xfrm>
             <a:off x="265500" y="1397349"/>
-            <a:ext cx="4045200" cy="1318202"/>
+            <a:ext cx="4045200" cy="1318203"/>
           </a:xfrm>
           <a:prstGeom prst="rect">
             <a:avLst/>
@@ -3928,7 +3890,7 @@
         <p:spPr>
           <a:xfrm>
             <a:off x="265500" y="2735371"/>
-            <a:ext cx="4045200" cy="1345502"/>
+            <a:ext cx="4045200" cy="1345503"/>
           </a:xfrm>
           <a:prstGeom prst="rect">
             <a:avLst/>
@@ -3937,7 +3899,7 @@
         <p:txBody>
           <a:bodyPr/>
           <a:lstStyle>
-            <a:lvl1pPr marL="228600" indent="-114300">
+            <a:lvl1pPr marL="114300" indent="0">
               <a:lnSpc>
                 <a:spcPct val="100000"/>
               </a:lnSpc>
@@ -3947,7 +3909,7 @@
               <a:buNone/>
               <a:defRPr sz="2100"/>
             </a:lvl1pPr>
-            <a:lvl2pPr marL="228600" indent="114300">
+            <a:lvl2pPr marL="114300" indent="114300">
               <a:lnSpc>
                 <a:spcPct val="100000"/>
               </a:lnSpc>
@@ -3957,7 +3919,7 @@
               <a:buNone/>
               <a:defRPr sz="2100"/>
             </a:lvl2pPr>
-            <a:lvl3pPr marL="228600" indent="114300">
+            <a:lvl3pPr marL="114300" indent="114300">
               <a:lnSpc>
                 <a:spcPct val="100000"/>
               </a:lnSpc>
@@ -3967,7 +3929,7 @@
               <a:buNone/>
               <a:defRPr sz="2100"/>
             </a:lvl3pPr>
-            <a:lvl4pPr marL="228600" indent="114300">
+            <a:lvl4pPr marL="114300" indent="114300">
               <a:lnSpc>
                 <a:spcPct val="100000"/>
               </a:lnSpc>
@@ -3977,7 +3939,7 @@
               <a:buNone/>
               <a:defRPr sz="2100"/>
             </a:lvl4pPr>
-            <a:lvl5pPr marL="228600" indent="114300">
+            <a:lvl5pPr marL="114300" indent="114300">
               <a:lnSpc>
                 <a:spcPct val="100000"/>
               </a:lnSpc>
@@ -4041,7 +4003,7 @@
           <a:bodyPr anchor="ctr"/>
           <a:lstStyle/>
           <a:p>
-            <a:pPr algn="l"/>
+            <a:pPr/>
           </a:p>
         </p:txBody>
       </p:sp>
@@ -4139,7 +4101,7 @@
         <p:spPr>
           <a:xfrm>
             <a:off x="425200" y="4739999"/>
-            <a:ext cx="8296800" cy="1"/>
+            <a:ext cx="8296801" cy="2"/>
           </a:xfrm>
           <a:prstGeom prst="line">
             <a:avLst/>
@@ -4167,7 +4129,7 @@
         <p:spPr>
           <a:xfrm>
             <a:off x="425197" y="415650"/>
-            <a:ext cx="183302" cy="1"/>
+            <a:ext cx="183303" cy="2"/>
           </a:xfrm>
           <a:prstGeom prst="line">
             <a:avLst/>
@@ -4197,7 +4159,7 @@
         <p:spPr>
           <a:xfrm>
             <a:off x="328016" y="4226023"/>
-            <a:ext cx="8388602" cy="393602"/>
+            <a:ext cx="8388602" cy="393603"/>
           </a:xfrm>
           <a:prstGeom prst="rect">
             <a:avLst/>
@@ -4215,28 +4177,28 @@
               <a:buFontTx/>
               <a:buNone/>
             </a:lvl1pPr>
-            <a:lvl2pPr algn="l">
+            <a:lvl2pPr marL="1233714" indent="-408213" algn="l">
               <a:lnSpc>
                 <a:spcPct val="100000"/>
               </a:lnSpc>
               <a:buClrTx/>
               <a:buFontTx/>
             </a:lvl2pPr>
-            <a:lvl3pPr algn="l">
+            <a:lvl3pPr marL="1690914" algn="l">
               <a:lnSpc>
                 <a:spcPct val="100000"/>
               </a:lnSpc>
               <a:buClrTx/>
               <a:buFontTx/>
             </a:lvl3pPr>
-            <a:lvl4pPr algn="l">
+            <a:lvl4pPr marL="2148114" algn="l">
               <a:lnSpc>
                 <a:spcPct val="100000"/>
               </a:lnSpc>
               <a:buClrTx/>
               <a:buFontTx/>
             </a:lvl4pPr>
-            <a:lvl5pPr algn="l">
+            <a:lvl5pPr marL="2605314" algn="l">
               <a:lnSpc>
                 <a:spcPct val="100000"/>
               </a:lnSpc>
@@ -4369,7 +4331,7 @@
         <p:spPr>
           <a:xfrm>
             <a:off x="425200" y="4739999"/>
-            <a:ext cx="8296800" cy="1"/>
+            <a:ext cx="8296801" cy="2"/>
           </a:xfrm>
           <a:prstGeom prst="line">
             <a:avLst/>
@@ -4397,7 +4359,7 @@
         <p:spPr>
           <a:xfrm>
             <a:off x="425200" y="415650"/>
-            <a:ext cx="8296800" cy="1"/>
+            <a:ext cx="8296801" cy="2"/>
           </a:xfrm>
           <a:prstGeom prst="line">
             <a:avLst/>
@@ -4442,7 +4404,7 @@
           </a:extLst>
         </p:spPr>
         <p:txBody>
-          <a:bodyPr lIns="91423" tIns="91423" rIns="91423" bIns="91423" anchor="ctr">
+          <a:bodyPr lIns="91422" tIns="91422" rIns="91422" bIns="91422" anchor="ctr">
             <a:normAutofit fontScale="100000" lnSpcReduction="0"/>
           </a:bodyPr>
           <a:lstStyle/>
@@ -4465,7 +4427,7 @@
         <p:spPr>
           <a:xfrm>
             <a:off x="853950" y="2919450"/>
-            <a:ext cx="7436102" cy="1071602"/>
+            <a:ext cx="7436102" cy="1071603"/>
           </a:xfrm>
           <a:prstGeom prst="rect">
             <a:avLst/>
@@ -4480,7 +4442,7 @@
           </a:extLst>
         </p:spPr>
         <p:txBody>
-          <a:bodyPr lIns="91423" tIns="91423" rIns="91423" bIns="91423">
+          <a:bodyPr lIns="91422" tIns="91422" rIns="91422" bIns="91422">
             <a:normAutofit fontScale="100000" lnSpcReduction="0"/>
           </a:bodyPr>
           <a:lstStyle/>
@@ -4526,8 +4488,8 @@
         </p:nvSpPr>
         <p:spPr>
           <a:xfrm>
-            <a:off x="8709888" y="4717935"/>
-            <a:ext cx="336811" cy="335249"/>
+            <a:off x="8709890" y="4717936"/>
+            <a:ext cx="336809" cy="335247"/>
           </a:xfrm>
           <a:prstGeom prst="rect">
             <a:avLst/>
@@ -4537,7 +4499,7 @@
           </a:ln>
         </p:spPr>
         <p:txBody>
-          <a:bodyPr wrap="none" lIns="91423" tIns="91423" rIns="91423" bIns="91423" anchor="ctr">
+          <a:bodyPr wrap="none" lIns="91422" tIns="91422" rIns="91422" bIns="91422" anchor="ctr">
             <a:normAutofit fontScale="100000" lnSpcReduction="0"/>
           </a:bodyPr>
           <a:lstStyle>
@@ -5337,8 +5299,8 @@
         </p:nvSpPr>
         <p:spPr>
           <a:xfrm>
-            <a:off x="2371725" y="630223"/>
-            <a:ext cx="6331500" cy="1542003"/>
+            <a:off x="2371725" y="630222"/>
+            <a:ext cx="6331500" cy="1542005"/>
           </a:xfrm>
           <a:prstGeom prst="rect">
             <a:avLst/>
@@ -5382,6 +5344,10 @@
           </p:nvPr>
         </p:nvSpPr>
         <p:spPr>
+          <a:xfrm>
+            <a:off x="2390267" y="3238450"/>
+            <a:ext cx="6331503" cy="1241700"/>
+          </a:xfrm>
           <a:prstGeom prst="rect">
             <a:avLst/>
           </a:prstGeom>
@@ -5390,7 +5356,7 @@
           <a:bodyPr/>
           <a:lstStyle/>
           <a:p>
-            <a:pPr marL="0" indent="0">
+            <a:pPr marL="0">
               <a:lnSpc>
                 <a:spcPct val="80000"/>
               </a:lnSpc>
@@ -5401,21 +5367,18 @@
             </a:r>
           </a:p>
           <a:p>
-            <a:pPr marL="0" indent="0">
+            <a:pPr marL="0">
               <a:lnSpc>
                 <a:spcPct val="80000"/>
               </a:lnSpc>
               <a:defRPr sz="1600"/>
             </a:pPr>
             <a:r>
-              <a:t>Herbert H. </a:t>
-            </a:r>
-            <a:r>
-              <a:t>Lehman High School</a:t>
-            </a:r>
-          </a:p>
-          <a:p>
-            <a:pPr marL="0" indent="0">
+              <a:t>Herbert H. Lehman High School</a:t>
+            </a:r>
+          </a:p>
+          <a:p>
+            <a:pPr marL="0">
               <a:lnSpc>
                 <a:spcPct val="80000"/>
               </a:lnSpc>
@@ -5455,13 +5418,17 @@
       </p:grpSpPr>
       <p:sp>
         <p:nvSpPr>
-          <p:cNvPr id="236" name="Independent work"/>
+          <p:cNvPr id="240" name="Independent work"/>
           <p:cNvSpPr txBox="1"/>
           <p:nvPr>
             <p:ph type="title"/>
           </p:nvPr>
         </p:nvSpPr>
         <p:spPr>
+          <a:xfrm>
+            <a:off x="2400250" y="575950"/>
+            <a:ext cx="6321601" cy="635403"/>
+          </a:xfrm>
           <a:prstGeom prst="rect">
             <a:avLst/>
           </a:prstGeom>
@@ -5469,8 +5436,8 @@
         <p:txBody>
           <a:bodyPr/>
           <a:lstStyle>
-            <a:lvl1pPr defTabSz="886968">
-              <a:defRPr sz="2910"/>
+            <a:lvl1pPr defTabSz="886967">
+              <a:defRPr sz="2900"/>
             </a:lvl1pPr>
           </a:lstStyle>
           <a:p>
@@ -5483,14 +5450,14 @@
       </p:sp>
       <p:sp>
         <p:nvSpPr>
-          <p:cNvPr id="237" name="1. Use elimination and back substitution to solve the systems below:"/>
+          <p:cNvPr id="241" name="1. Use elimination and back substitution to solve the systems below:"/>
           <p:cNvSpPr txBox="1"/>
           <p:nvPr/>
         </p:nvSpPr>
         <p:spPr>
           <a:xfrm>
-            <a:off x="306325" y="1352600"/>
-            <a:ext cx="7247773" cy="215901"/>
+            <a:off x="306324" y="1352600"/>
+            <a:ext cx="7247775" cy="431801"/>
           </a:xfrm>
           <a:prstGeom prst="rect">
             <a:avLst/>
@@ -5508,18 +5475,27 @@
           <a:bodyPr lIns="0" tIns="0" rIns="0" bIns="0">
             <a:spAutoFit/>
           </a:bodyPr>
-          <a:lstStyle/>
+          <a:lstStyle>
+            <a:lvl1pPr>
+              <a:defRPr>
+                <a:latin typeface="+mj-lt"/>
+                <a:ea typeface="+mj-ea"/>
+                <a:cs typeface="+mj-cs"/>
+                <a:sym typeface="Helvetica"/>
+              </a:defRPr>
+            </a:lvl1pPr>
+          </a:lstStyle>
           <a:p>
             <a:pPr/>
             <a:r>
-              <a:t>1. Use elimination and back substitution to solve the systems below:</a:t>
+              <a:t>1. Use elimination and back substitution to solve the systems below. Be sure to show all work:</a:t>
             </a:r>
           </a:p>
         </p:txBody>
       </p:sp>
       <p:pic>
         <p:nvPicPr>
-          <p:cNvPr id="238" name="Image" descr="Image"/>
+          <p:cNvPr id="242" name="Image" descr="Image"/>
           <p:cNvPicPr>
             <a:picLocks noChangeAspect="1"/>
           </p:cNvPicPr>
@@ -5535,8 +5511,8 @@
         </p:blipFill>
         <p:spPr>
           <a:xfrm>
-            <a:off x="510799" y="2100353"/>
-            <a:ext cx="2313642" cy="965201"/>
+            <a:off x="3450145" y="1944249"/>
+            <a:ext cx="2313643" cy="965202"/>
           </a:xfrm>
           <a:prstGeom prst="rect">
             <a:avLst/>
@@ -5548,13 +5524,13 @@
       </p:pic>
       <p:sp>
         <p:nvSpPr>
-          <p:cNvPr id="239" name="a."/>
+          <p:cNvPr id="243" name="a."/>
           <p:cNvSpPr txBox="1"/>
           <p:nvPr/>
         </p:nvSpPr>
         <p:spPr>
           <a:xfrm>
-            <a:off x="436356" y="1902268"/>
+            <a:off x="436356" y="1902267"/>
             <a:ext cx="160983" cy="215901"/>
           </a:xfrm>
           <a:prstGeom prst="rect">
@@ -5573,7 +5549,16 @@
           <a:bodyPr wrap="none" lIns="0" tIns="0" rIns="0" bIns="0">
             <a:spAutoFit/>
           </a:bodyPr>
-          <a:lstStyle/>
+          <a:lstStyle>
+            <a:lvl1pPr>
+              <a:defRPr>
+                <a:latin typeface="+mj-lt"/>
+                <a:ea typeface="+mj-ea"/>
+                <a:cs typeface="+mj-cs"/>
+                <a:sym typeface="Helvetica"/>
+              </a:defRPr>
+            </a:lvl1pPr>
+          </a:lstStyle>
           <a:p>
             <a:pPr/>
             <a:r>
@@ -5584,14 +5569,14 @@
       </p:sp>
       <p:sp>
         <p:nvSpPr>
-          <p:cNvPr id="240" name="b."/>
+          <p:cNvPr id="244" name="b."/>
           <p:cNvSpPr txBox="1"/>
           <p:nvPr/>
         </p:nvSpPr>
         <p:spPr>
           <a:xfrm>
-            <a:off x="3196795" y="1902268"/>
-            <a:ext cx="160983" cy="215901"/>
+            <a:off x="3196794" y="1902267"/>
+            <a:ext cx="160984" cy="215901"/>
           </a:xfrm>
           <a:prstGeom prst="rect">
             <a:avLst/>
@@ -5609,7 +5594,16 @@
           <a:bodyPr wrap="none" lIns="0" tIns="0" rIns="0" bIns="0">
             <a:spAutoFit/>
           </a:bodyPr>
-          <a:lstStyle/>
+          <a:lstStyle>
+            <a:lvl1pPr>
+              <a:defRPr>
+                <a:latin typeface="+mj-lt"/>
+                <a:ea typeface="+mj-ea"/>
+                <a:cs typeface="+mj-cs"/>
+                <a:sym typeface="Helvetica"/>
+              </a:defRPr>
+            </a:lvl1pPr>
+          </a:lstStyle>
           <a:p>
             <a:pPr/>
             <a:r>
@@ -5620,7 +5614,7 @@
       </p:sp>
       <p:pic>
         <p:nvPicPr>
-          <p:cNvPr id="241" name="Image" descr="Image"/>
+          <p:cNvPr id="245" name="Image" descr="Image"/>
           <p:cNvPicPr>
             <a:picLocks noChangeAspect="1"/>
           </p:cNvPicPr>
@@ -5636,8 +5630,8 @@
         </p:blipFill>
         <p:spPr>
           <a:xfrm>
-            <a:off x="3278910" y="2100182"/>
-            <a:ext cx="2313642" cy="1065678"/>
+            <a:off x="598494" y="1894011"/>
+            <a:ext cx="2313643" cy="1065679"/>
           </a:xfrm>
           <a:prstGeom prst="rect">
             <a:avLst/>
@@ -5649,14 +5643,14 @@
       </p:pic>
       <p:sp>
         <p:nvSpPr>
-          <p:cNvPr id="242" name="c."/>
+          <p:cNvPr id="246" name="c."/>
           <p:cNvSpPr txBox="1"/>
           <p:nvPr/>
         </p:nvSpPr>
         <p:spPr>
           <a:xfrm>
-            <a:off x="5786222" y="1902268"/>
-            <a:ext cx="1663865" cy="215901"/>
+            <a:off x="5786222" y="1902267"/>
+            <a:ext cx="1663864" cy="215901"/>
           </a:xfrm>
           <a:prstGeom prst="rect">
             <a:avLst/>
@@ -5674,7 +5668,16 @@
           <a:bodyPr lIns="0" tIns="0" rIns="0" bIns="0">
             <a:spAutoFit/>
           </a:bodyPr>
-          <a:lstStyle/>
+          <a:lstStyle>
+            <a:lvl1pPr>
+              <a:defRPr>
+                <a:latin typeface="+mj-lt"/>
+                <a:ea typeface="+mj-ea"/>
+                <a:cs typeface="+mj-cs"/>
+                <a:sym typeface="Helvetica"/>
+              </a:defRPr>
+            </a:lvl1pPr>
+          </a:lstStyle>
           <a:p>
             <a:pPr/>
             <a:r>
@@ -5685,7 +5688,7 @@
       </p:sp>
       <p:pic>
         <p:nvPicPr>
-          <p:cNvPr id="243" name="Image" descr="Image"/>
+          <p:cNvPr id="247" name="Image" descr="Image"/>
           <p:cNvPicPr>
             <a:picLocks noChangeAspect="1"/>
           </p:cNvPicPr>
@@ -5701,8 +5704,8 @@
         </p:blipFill>
         <p:spPr>
           <a:xfrm>
-            <a:off x="5856154" y="1977640"/>
-            <a:ext cx="2574477" cy="1188221"/>
+            <a:off x="5957233" y="1944249"/>
+            <a:ext cx="2574478" cy="1188222"/>
           </a:xfrm>
           <a:prstGeom prst="rect">
             <a:avLst/>
@@ -5740,13 +5743,17 @@
       </p:grpSpPr>
       <p:sp>
         <p:nvSpPr>
-          <p:cNvPr id="245" name="Reflection"/>
+          <p:cNvPr id="249" name="Reflection"/>
           <p:cNvSpPr txBox="1"/>
           <p:nvPr>
             <p:ph type="title"/>
           </p:nvPr>
         </p:nvSpPr>
         <p:spPr>
+          <a:xfrm>
+            <a:off x="2400250" y="575950"/>
+            <a:ext cx="6321601" cy="635403"/>
+          </a:xfrm>
           <a:prstGeom prst="rect">
             <a:avLst/>
           </a:prstGeom>
@@ -5754,8 +5761,8 @@
         <p:txBody>
           <a:bodyPr/>
           <a:lstStyle>
-            <a:lvl1pPr defTabSz="886968">
-              <a:defRPr sz="2910"/>
+            <a:lvl1pPr defTabSz="886967">
+              <a:defRPr sz="2900"/>
             </a:lvl1pPr>
           </a:lstStyle>
           <a:p>
@@ -5768,13 +5775,17 @@
       </p:sp>
       <p:sp>
         <p:nvSpPr>
-          <p:cNvPr id="246" name="How is elimination different from substitution?…"/>
+          <p:cNvPr id="250" name="How is elimination different from substitution?…"/>
           <p:cNvSpPr txBox="1"/>
           <p:nvPr>
             <p:ph type="body" idx="1"/>
           </p:nvPr>
         </p:nvSpPr>
         <p:spPr>
+          <a:xfrm>
+            <a:off x="2410110" y="1595776"/>
+            <a:ext cx="6321605" cy="3002403"/>
+          </a:xfrm>
           <a:prstGeom prst="rect">
             <a:avLst/>
           </a:prstGeom>
@@ -5824,14 +5835,14 @@
       </p:grpSpPr>
       <p:sp>
         <p:nvSpPr>
-          <p:cNvPr id="250" name="Google Shape;119;p19"/>
+          <p:cNvPr id="254" name="Google Shape;119;p19"/>
           <p:cNvSpPr txBox="1"/>
           <p:nvPr/>
         </p:nvSpPr>
         <p:spPr>
           <a:xfrm>
-            <a:off x="2463308" y="1404067"/>
-            <a:ext cx="10603771" cy="2452971"/>
+            <a:off x="2463307" y="1404067"/>
+            <a:ext cx="10603773" cy="2452972"/>
           </a:xfrm>
           <a:prstGeom prst="rect">
             <a:avLst/>
@@ -5846,12 +5857,12 @@
           </a:extLst>
         </p:spPr>
         <p:txBody>
-          <a:bodyPr lIns="243799" tIns="243799" rIns="243799" bIns="243799">
+          <a:bodyPr lIns="243798" tIns="243798" rIns="243798" bIns="243798">
             <a:normAutofit fontScale="100000" lnSpcReduction="0"/>
           </a:bodyPr>
           <a:lstStyle/>
           <a:p>
-            <a:pPr marL="629708" indent="-629708" defTabSz="2438400">
+            <a:pPr marL="629707" indent="-629707" defTabSz="2438400">
               <a:lnSpc>
                 <a:spcPct val="115000"/>
               </a:lnSpc>
@@ -5861,10 +5872,6 @@
                 <a:solidFill>
                   <a:srgbClr val="171717"/>
                 </a:solidFill>
-                <a:latin typeface="+mn-lt"/>
-                <a:ea typeface="+mn-ea"/>
-                <a:cs typeface="+mn-cs"/>
-                <a:sym typeface="Arial"/>
               </a:defRPr>
             </a:pPr>
             <a:r>
@@ -5872,7 +5879,7 @@
             </a:r>
           </a:p>
           <a:p>
-            <a:pPr marL="629708" indent="-629708" defTabSz="2438400">
+            <a:pPr marL="629707" indent="-629707" defTabSz="2438400">
               <a:lnSpc>
                 <a:spcPct val="115000"/>
               </a:lnSpc>
@@ -5882,10 +5889,6 @@
                 <a:solidFill>
                   <a:srgbClr val="171717"/>
                 </a:solidFill>
-                <a:latin typeface="+mn-lt"/>
-                <a:ea typeface="+mn-ea"/>
-                <a:cs typeface="+mn-cs"/>
-                <a:sym typeface="Arial"/>
               </a:defRPr>
             </a:pPr>
             <a:r>
@@ -5893,7 +5896,7 @@
             </a:r>
           </a:p>
           <a:p>
-            <a:pPr marL="629708" indent="-629708" defTabSz="2438400">
+            <a:pPr marL="629707" indent="-629707" defTabSz="2438400">
               <a:lnSpc>
                 <a:spcPct val="115000"/>
               </a:lnSpc>
@@ -5903,10 +5906,6 @@
                 <a:solidFill>
                   <a:srgbClr val="171717"/>
                 </a:solidFill>
-                <a:latin typeface="+mn-lt"/>
-                <a:ea typeface="+mn-ea"/>
-                <a:cs typeface="+mn-cs"/>
-                <a:sym typeface="Arial"/>
               </a:defRPr>
             </a:pPr>
             <a:r>
@@ -5914,7 +5913,7 @@
             </a:r>
           </a:p>
           <a:p>
-            <a:pPr marL="629708" indent="-629708" defTabSz="2438400">
+            <a:pPr marL="629707" indent="-629707" defTabSz="2438400">
               <a:lnSpc>
                 <a:spcPct val="115000"/>
               </a:lnSpc>
@@ -5924,10 +5923,6 @@
                 <a:solidFill>
                   <a:srgbClr val="171717"/>
                 </a:solidFill>
-                <a:latin typeface="+mn-lt"/>
-                <a:ea typeface="+mn-ea"/>
-                <a:cs typeface="+mn-cs"/>
-                <a:sym typeface="Arial"/>
               </a:defRPr>
             </a:pPr>
             <a:r>
@@ -5938,28 +5933,28 @@
       </p:sp>
       <p:grpSp>
         <p:nvGrpSpPr>
-          <p:cNvPr id="253" name="Google Shape;118;p19"/>
+          <p:cNvPr id="257" name="Google Shape;118;p19"/>
           <p:cNvGrpSpPr/>
           <p:nvPr/>
         </p:nvGrpSpPr>
         <p:grpSpPr>
           <a:xfrm>
-            <a:off x="2147095" y="500360"/>
-            <a:ext cx="6535195" cy="810605"/>
-            <a:chOff x="0" y="0"/>
-            <a:chExt cx="6535193" cy="810604"/>
+            <a:off x="2147093" y="500359"/>
+            <a:ext cx="6535198" cy="810607"/>
+            <a:chOff x="-1" y="0"/>
+            <a:chExt cx="6535197" cy="810605"/>
           </a:xfrm>
         </p:grpSpPr>
         <p:sp>
           <p:nvSpPr>
-            <p:cNvPr id="251" name="Rectangle"/>
+            <p:cNvPr id="255" name="Rectangle"/>
             <p:cNvSpPr/>
             <p:nvPr/>
           </p:nvSpPr>
           <p:spPr>
             <a:xfrm>
-              <a:off x="-1" y="-1"/>
-              <a:ext cx="6535195" cy="810606"/>
+              <a:off x="-2" y="-1"/>
+              <a:ext cx="6535198" cy="810607"/>
             </a:xfrm>
             <a:prstGeom prst="rect">
               <a:avLst/>
@@ -5989,6 +5984,10 @@
                       <a:lumOff val="-9098"/>
                     </a:schemeClr>
                   </a:solidFill>
+                  <a:latin typeface="+mj-lt"/>
+                  <a:ea typeface="+mj-ea"/>
+                  <a:cs typeface="+mj-cs"/>
+                  <a:sym typeface="Helvetica"/>
                 </a:defRPr>
               </a:pPr>
             </a:p>
@@ -5996,14 +5995,14 @@
         </p:sp>
         <p:sp>
           <p:nvSpPr>
-            <p:cNvPr id="252" name="wrapping up!…"/>
+            <p:cNvPr id="256" name="wrapping up!…"/>
             <p:cNvSpPr txBox="1"/>
             <p:nvPr/>
           </p:nvSpPr>
           <p:spPr>
             <a:xfrm>
-              <a:off x="12699" y="12699"/>
-              <a:ext cx="6509795" cy="785206"/>
+              <a:off x="12698" y="12699"/>
+              <a:ext cx="6509798" cy="785207"/>
             </a:xfrm>
             <a:prstGeom prst="rect">
               <a:avLst/>
@@ -6021,18 +6020,13 @@
             </a:extLst>
           </p:spPr>
           <p:txBody>
-            <a:bodyPr wrap="square" lIns="91422" tIns="91422" rIns="91422" bIns="91422" numCol="1" anchor="t">
+            <a:bodyPr wrap="square" lIns="91421" tIns="91421" rIns="91421" bIns="91421" numCol="1" anchor="t">
               <a:normAutofit fontScale="100000" lnSpcReduction="0"/>
             </a:bodyPr>
             <a:lstStyle/>
             <a:p>
               <a:pPr>
-                <a:defRPr sz="2400">
-                  <a:latin typeface="+mn-lt"/>
-                  <a:ea typeface="+mn-ea"/>
-                  <a:cs typeface="+mn-cs"/>
-                  <a:sym typeface="Arial"/>
-                </a:defRPr>
+                <a:defRPr sz="2400"/>
               </a:pPr>
               <a:r>
                 <a:t>wrapping up!</a:t>
@@ -6044,6 +6038,10 @@
                   <a:solidFill>
                     <a:schemeClr val="accent5"/>
                   </a:solidFill>
+                  <a:latin typeface="+mj-lt"/>
+                  <a:ea typeface="+mj-ea"/>
+                  <a:cs typeface="+mj-cs"/>
+                  <a:sym typeface="Helvetica"/>
                 </a:defRPr>
               </a:pPr>
               <a:r>
@@ -6073,7 +6071,7 @@
       </p:grpSp>
       <p:pic>
         <p:nvPicPr>
-          <p:cNvPr id="254" name="Image" descr="Image"/>
+          <p:cNvPr id="258" name="Image" descr="Image"/>
           <p:cNvPicPr>
             <a:picLocks noChangeAspect="1"/>
           </p:cNvPicPr>
@@ -6089,8 +6087,8 @@
         </p:blipFill>
         <p:spPr>
           <a:xfrm>
-            <a:off x="281021" y="1497170"/>
-            <a:ext cx="2126173" cy="1811185"/>
+            <a:off x="281021" y="1497169"/>
+            <a:ext cx="2126173" cy="1811186"/>
           </a:xfrm>
           <a:prstGeom prst="rect">
             <a:avLst/>
@@ -6134,8 +6132,8 @@
         </p:nvSpPr>
         <p:spPr>
           <a:xfrm>
-            <a:off x="2416655" y="60050"/>
-            <a:ext cx="3203497" cy="368301"/>
+            <a:off x="2416654" y="60049"/>
+            <a:ext cx="3203499" cy="266701"/>
           </a:xfrm>
           <a:prstGeom prst="rect">
             <a:avLst/>
@@ -6161,7 +6159,12 @@
           </a:bodyPr>
           <a:lstStyle>
             <a:lvl1pPr>
-              <a:defRPr sz="1700"/>
+              <a:defRPr sz="1700">
+                <a:latin typeface="+mj-lt"/>
+                <a:ea typeface="+mj-ea"/>
+                <a:cs typeface="+mj-cs"/>
+                <a:sym typeface="Helvetica"/>
+              </a:defRPr>
             </a:lvl1pPr>
           </a:lstStyle>
           <a:p>
@@ -6180,8 +6183,8 @@
         </p:nvSpPr>
         <p:spPr>
           <a:xfrm>
-            <a:off x="1775626" y="666681"/>
-            <a:ext cx="6269918" cy="977901"/>
+            <a:off x="1775625" y="666681"/>
+            <a:ext cx="6269919" cy="736601"/>
           </a:xfrm>
           <a:prstGeom prst="rect">
             <a:avLst/>
@@ -6215,6 +6218,10 @@
                     <a:lumOff val="12696"/>
                   </a:schemeClr>
                 </a:solidFill>
+                <a:latin typeface="+mj-lt"/>
+                <a:ea typeface="+mj-ea"/>
+                <a:cs typeface="+mj-cs"/>
+                <a:sym typeface="Helvetica"/>
               </a:defRPr>
             </a:pPr>
             <a:r>
@@ -6228,13 +6235,6 @@
               </a:rPr>
               <a:t>Get out your notebook/binder. Read the paragraph below carefully, then answer the questions below. Show all work and check your results!</a:t>
             </a:r>
-            <a:endParaRPr>
-              <a:solidFill>
-                <a:schemeClr val="accent1">
-                  <a:lumOff val="-6117"/>
-                </a:schemeClr>
-              </a:solidFill>
-            </a:endParaRPr>
           </a:p>
         </p:txBody>
       </p:sp>
@@ -6277,6 +6277,10 @@
                 <a:solidFill>
                   <a:schemeClr val="accent5"/>
                 </a:solidFill>
+                <a:latin typeface="+mj-lt"/>
+                <a:ea typeface="+mj-ea"/>
+                <a:cs typeface="+mj-cs"/>
+                <a:sym typeface="Helvetica"/>
               </a:defRPr>
             </a:pPr>
             <a:r>
@@ -6326,6 +6330,10 @@
                 <a:solidFill>
                   <a:schemeClr val="accent5"/>
                 </a:solidFill>
+                <a:latin typeface="+mj-lt"/>
+                <a:ea typeface="+mj-ea"/>
+                <a:cs typeface="+mj-cs"/>
+                <a:sym typeface="Helvetica"/>
               </a:defRPr>
             </a:pPr>
             <a:r>
@@ -6356,6 +6364,10 @@
                 <a:solidFill>
                   <a:schemeClr val="accent5"/>
                 </a:solidFill>
+                <a:latin typeface="+mj-lt"/>
+                <a:ea typeface="+mj-ea"/>
+                <a:cs typeface="+mj-cs"/>
+                <a:sym typeface="Helvetica"/>
               </a:defRPr>
             </a:pPr>
             <a:r>
@@ -6385,8 +6397,8 @@
         </p:nvSpPr>
         <p:spPr>
           <a:xfrm>
-            <a:off x="5680802" y="1876563"/>
-            <a:ext cx="1270890" cy="665844"/>
+            <a:off x="5680802" y="1876562"/>
+            <a:ext cx="1525355" cy="725257"/>
           </a:xfrm>
           <a:prstGeom prst="rect">
             <a:avLst/>
@@ -6407,12 +6419,14 @@
           <a:lstStyle/>
           <a:p>
             <a:pPr>
-              <a:defRPr>
+              <a:defRPr sz="1600">
                 <a:solidFill>
-                  <a:schemeClr val="accent1">
-                    <a:lumOff val="-6117"/>
-                  </a:schemeClr>
+                  <a:srgbClr val="00457C"/>
                 </a:solidFill>
+                <a:latin typeface="Cambria Math"/>
+                <a:ea typeface="Cambria Math"/>
+                <a:cs typeface="Cambria Math"/>
+                <a:sym typeface="Cambria Math"/>
               </a:defRPr>
             </a:pPr>
             <a14:m>
@@ -6478,6 +6492,17 @@
                 </m:oMath>
               </m:oMathPara>
             </a14:m>
+            <a:endParaRPr>
+              <a:solidFill>
+                <a:schemeClr val="accent1">
+                  <a:lumOff val="-6117"/>
+                </a:schemeClr>
+              </a:solidFill>
+              <a:latin typeface="+mj-lt"/>
+              <a:ea typeface="+mj-ea"/>
+              <a:cs typeface="+mj-cs"/>
+              <a:sym typeface="Helvetica"/>
+            </a:endParaRPr>
           </a:p>
           <a:p>
             <a:pPr>
@@ -6487,17 +6512,23 @@
                     <a:lumOff val="-6117"/>
                   </a:schemeClr>
                 </a:solidFill>
+                <a:latin typeface="+mj-lt"/>
+                <a:ea typeface="+mj-ea"/>
+                <a:cs typeface="+mj-cs"/>
+                <a:sym typeface="Helvetica"/>
               </a:defRPr>
             </a:pPr>
           </a:p>
           <a:p>
             <a:pPr>
-              <a:defRPr>
+              <a:defRPr sz="1700">
                 <a:solidFill>
-                  <a:schemeClr val="accent1">
-                    <a:lumOff val="-6117"/>
-                  </a:schemeClr>
+                  <a:srgbClr val="00457C"/>
                 </a:solidFill>
+                <a:latin typeface="Cambria Math"/>
+                <a:ea typeface="Cambria Math"/>
+                <a:cs typeface="Cambria Math"/>
+                <a:sym typeface="Cambria Math"/>
               </a:defRPr>
             </a:pPr>
             <a14:m>
@@ -6507,7 +6538,7 @@
                 </m:oMathParaPr>
                 <m:oMath>
                   <m:r>
-                    <a:rPr xmlns:a="http://schemas.openxmlformats.org/drawingml/2006/main" sz="1700" i="1">
+                    <a:rPr xmlns:a="http://schemas.openxmlformats.org/drawingml/2006/main" sz="2050" i="1">
                       <a:solidFill>
                         <a:srgbClr val="00457C"/>
                       </a:solidFill>
@@ -6516,7 +6547,7 @@
                     <m:t>2</m:t>
                   </m:r>
                   <m:r>
-                    <a:rPr xmlns:a="http://schemas.openxmlformats.org/drawingml/2006/main" sz="1700" i="1">
+                    <a:rPr xmlns:a="http://schemas.openxmlformats.org/drawingml/2006/main" sz="2050" i="1">
                       <a:solidFill>
                         <a:srgbClr val="00457C"/>
                       </a:solidFill>
@@ -6525,7 +6556,7 @@
                     <m:t>x</m:t>
                   </m:r>
                   <m:r>
-                    <a:rPr xmlns:a="http://schemas.openxmlformats.org/drawingml/2006/main" sz="1700" i="1">
+                    <a:rPr xmlns:a="http://schemas.openxmlformats.org/drawingml/2006/main" sz="2050" i="1">
                       <a:solidFill>
                         <a:srgbClr val="00457C"/>
                       </a:solidFill>
@@ -6534,7 +6565,7 @@
                     <m:t>+</m:t>
                   </m:r>
                   <m:r>
-                    <a:rPr xmlns:a="http://schemas.openxmlformats.org/drawingml/2006/main" sz="1700" i="1">
+                    <a:rPr xmlns:a="http://schemas.openxmlformats.org/drawingml/2006/main" sz="2050" i="1">
                       <a:solidFill>
                         <a:srgbClr val="00457C"/>
                       </a:solidFill>
@@ -6543,7 +6574,7 @@
                     <m:t>3</m:t>
                   </m:r>
                   <m:r>
-                    <a:rPr xmlns:a="http://schemas.openxmlformats.org/drawingml/2006/main" sz="1700" i="1">
+                    <a:rPr xmlns:a="http://schemas.openxmlformats.org/drawingml/2006/main" sz="2050" i="1">
                       <a:solidFill>
                         <a:srgbClr val="00457C"/>
                       </a:solidFill>
@@ -6552,7 +6583,7 @@
                     <m:t>y</m:t>
                   </m:r>
                   <m:r>
-                    <a:rPr xmlns:a="http://schemas.openxmlformats.org/drawingml/2006/main" sz="1700" i="1">
+                    <a:rPr xmlns:a="http://schemas.openxmlformats.org/drawingml/2006/main" sz="2050" i="1">
                       <a:solidFill>
                         <a:srgbClr val="00457C"/>
                       </a:solidFill>
@@ -6561,7 +6592,7 @@
                     <m:t>=</m:t>
                   </m:r>
                   <m:r>
-                    <a:rPr xmlns:a="http://schemas.openxmlformats.org/drawingml/2006/main" sz="1700" i="1">
+                    <a:rPr xmlns:a="http://schemas.openxmlformats.org/drawingml/2006/main" sz="2050" i="1">
                       <a:solidFill>
                         <a:srgbClr val="00457C"/>
                       </a:solidFill>
@@ -6570,7 +6601,7 @@
                     <m:t>-</m:t>
                   </m:r>
                   <m:r>
-                    <a:rPr xmlns:a="http://schemas.openxmlformats.org/drawingml/2006/main" sz="1700" i="1">
+                    <a:rPr xmlns:a="http://schemas.openxmlformats.org/drawingml/2006/main" sz="2050" i="1">
                       <a:solidFill>
                         <a:srgbClr val="00457C"/>
                       </a:solidFill>
@@ -6679,54 +6710,6 @@
                       </p:childTnLst>
                     </p:cTn>
                   </p:par>
-                  <p:par>
-                    <p:cTn id="9" fill="hold">
-                      <p:stCondLst>
-                        <p:cond delay="indefinite"/>
-                      </p:stCondLst>
-                      <p:childTnLst>
-                        <p:par>
-                          <p:cTn id="10" fill="hold">
-                            <p:stCondLst>
-                              <p:cond delay="0"/>
-                            </p:stCondLst>
-                            <p:childTnLst>
-                              <p:par>
-                                <p:cTn id="11" presetClass="entr" nodeType="clickEffect" presetSubtype="0" presetID="1" grpId="1" fill="hold">
-                                  <p:stCondLst>
-                                    <p:cond delay="0"/>
-                                  </p:stCondLst>
-                                  <p:iterate type="el" backwards="0">
-                                    <p:tmAbs val="0"/>
-                                  </p:iterate>
-                                  <p:childTnLst>
-                                    <p:set>
-                                      <p:cBhvr>
-                                        <p:cTn id="12" fill="hold"/>
-                                        <p:tgtEl>
-                                          <p:spTgt spid="189">
-                                            <p:txEl>
-                                              <p:pRg st="1" end="1"/>
-                                            </p:txEl>
-                                          </p:spTgt>
-                                        </p:tgtEl>
-                                        <p:attrNameLst>
-                                          <p:attrName>style.visibility</p:attrName>
-                                        </p:attrNameLst>
-                                      </p:cBhvr>
-                                      <p:to>
-                                        <p:strVal val="visible"/>
-                                      </p:to>
-                                    </p:set>
-                                  </p:childTnLst>
-                                </p:cTn>
-                              </p:par>
-                            </p:childTnLst>
-                          </p:cTn>
-                        </p:par>
-                      </p:childTnLst>
-                    </p:cTn>
-                  </p:par>
                 </p:childTnLst>
               </p:cTn>
               <p:prevCondLst>
@@ -6783,7 +6766,7 @@
         <p:spPr>
           <a:xfrm>
             <a:off x="1424035" y="575950"/>
-            <a:ext cx="7302729" cy="939691"/>
+            <a:ext cx="7302728" cy="939692"/>
           </a:xfrm>
           <a:prstGeom prst="rect">
             <a:avLst/>
@@ -6799,7 +6782,7 @@
           </a:ln>
         </p:spPr>
         <p:txBody>
-          <a:bodyPr lIns="91422" tIns="91422" rIns="91422" bIns="91422"/>
+          <a:bodyPr lIns="91421" tIns="91421" rIns="91421" bIns="91421"/>
           <a:lstStyle>
             <a:lvl1pPr defTabSz="813816">
               <a:defRPr b="0" sz="2100">
@@ -6829,8 +6812,8 @@
         </p:nvSpPr>
         <p:spPr>
           <a:xfrm>
-            <a:off x="350267" y="1656889"/>
-            <a:ext cx="7462021" cy="1943101"/>
+            <a:off x="350266" y="1656888"/>
+            <a:ext cx="7462023" cy="1943101"/>
           </a:xfrm>
           <a:prstGeom prst="rect">
             <a:avLst/>
@@ -6855,6 +6838,10 @@
                 <a:solidFill>
                   <a:srgbClr val="011D57"/>
                 </a:solidFill>
+                <a:latin typeface="+mj-lt"/>
+                <a:ea typeface="+mj-ea"/>
+                <a:cs typeface="+mj-cs"/>
+                <a:sym typeface="Helvetica"/>
               </a:defRPr>
             </a:pPr>
             <a:r>
@@ -6878,17 +6865,25 @@
                 <a:solidFill>
                   <a:srgbClr val="011D57"/>
                 </a:solidFill>
+                <a:latin typeface="+mj-lt"/>
+                <a:ea typeface="+mj-ea"/>
+                <a:cs typeface="+mj-cs"/>
+                <a:sym typeface="Helvetica"/>
               </a:defRPr>
             </a:pPr>
           </a:p>
           <a:p>
-            <a:pPr marL="187157" indent="-187157">
+            <a:pPr marL="187156" indent="-187156">
               <a:buSzPct val="100000"/>
               <a:buAutoNum type="arabicPeriod" startAt="1"/>
               <a:defRPr>
                 <a:solidFill>
                   <a:srgbClr val="011D57"/>
                 </a:solidFill>
+                <a:latin typeface="+mj-lt"/>
+                <a:ea typeface="+mj-ea"/>
+                <a:cs typeface="+mj-cs"/>
+                <a:sym typeface="Helvetica"/>
               </a:defRPr>
             </a:pPr>
             <a:r>
@@ -6918,13 +6913,17 @@
             </a:r>
           </a:p>
           <a:p>
-            <a:pPr marL="187157" indent="-187157">
+            <a:pPr marL="187156" indent="-187156">
               <a:buSzPct val="100000"/>
               <a:buAutoNum type="arabicPeriod" startAt="1"/>
               <a:defRPr>
                 <a:solidFill>
                   <a:srgbClr val="011D57"/>
                 </a:solidFill>
+                <a:latin typeface="+mj-lt"/>
+                <a:ea typeface="+mj-ea"/>
+                <a:cs typeface="+mj-cs"/>
+                <a:sym typeface="Helvetica"/>
               </a:defRPr>
             </a:pPr>
             <a:r>
@@ -6932,13 +6931,17 @@
             </a:r>
           </a:p>
           <a:p>
-            <a:pPr marL="187157" indent="-187157">
+            <a:pPr marL="187156" indent="-187156">
               <a:buSzPct val="100000"/>
               <a:buAutoNum type="arabicPeriod" startAt="1"/>
               <a:defRPr b="1" i="1" u="sng">
                 <a:solidFill>
                   <a:srgbClr val="E22400"/>
                 </a:solidFill>
+                <a:latin typeface="+mj-lt"/>
+                <a:ea typeface="+mj-ea"/>
+                <a:cs typeface="+mj-cs"/>
+                <a:sym typeface="Helvetica"/>
               </a:defRPr>
             </a:pPr>
             <a:r>
@@ -6952,39 +6955,38 @@
               </a:rPr>
               <a:t>  </a:t>
             </a:r>
-            <a:endParaRPr b="0" i="0" u="none">
+            <a:endParaRPr>
               <a:solidFill>
                 <a:srgbClr val="011D57"/>
               </a:solidFill>
             </a:endParaRPr>
           </a:p>
           <a:p>
-            <a:pPr marL="187157" indent="-187157">
+            <a:pPr marL="187156" indent="-187156">
               <a:buSzPct val="100000"/>
               <a:buAutoNum type="arabicPeriod" startAt="1"/>
-              <a:defRPr b="1" i="1" u="sng">
+              <a:defRPr>
+                <a:solidFill>
+                  <a:srgbClr val="011D57"/>
+                </a:solidFill>
+                <a:latin typeface="+mj-lt"/>
+                <a:ea typeface="+mj-ea"/>
+                <a:cs typeface="+mj-cs"/>
+                <a:sym typeface="Helvetica"/>
+              </a:defRPr>
+            </a:pPr>
+            <a:r>
+              <a:t>At the end of the period, you’ll be directed to assemble for the exit ticket/debrief. Log out of your computer, and </a:t>
+            </a:r>
+            <a:r>
+              <a:rPr b="1" i="1" u="sng">
                 <a:solidFill>
                   <a:srgbClr val="E22400"/>
                 </a:solidFill>
-              </a:defRPr>
-            </a:pPr>
-            <a:r>
-              <a:rPr b="0" i="0" u="none">
-                <a:solidFill>
-                  <a:srgbClr val="011D57"/>
-                </a:solidFill>
               </a:rPr>
-              <a:t>At the end of the period, you’ll be directed to assemble for the exit ticket/debrief. Log out of your computer, and </a:t>
-            </a:r>
-            <a:r>
               <a:t>quietly </a:t>
             </a:r>
             <a:r>
-              <a:rPr b="0" i="0" u="none">
-                <a:solidFill>
-                  <a:srgbClr val="011D57"/>
-                </a:solidFill>
-              </a:rPr>
               <a:t>return to a seat near the front.</a:t>
             </a:r>
           </a:p>
@@ -7093,149 +7095,210 @@
           <a:chExt cx="0" cy="0"/>
         </a:xfrm>
       </p:grpSpPr>
-      <p:sp>
-        <p:nvSpPr>
-          <p:cNvPr id="198" name="framing…"/>
-          <p:cNvSpPr txBox="1"/>
+      <p:grpSp>
+        <p:nvGrpSpPr>
+          <p:cNvPr id="200" name="framing…"/>
+          <p:cNvGrpSpPr/>
           <p:nvPr/>
-        </p:nvSpPr>
-        <p:spPr>
-          <a:xfrm>
-            <a:off x="4138003" y="1037939"/>
-            <a:ext cx="4070437" cy="2988429"/>
-          </a:xfrm>
-          <a:prstGeom prst="rect">
-            <a:avLst/>
-          </a:prstGeom>
-          <a:ln w="25400">
-            <a:solidFill>
-              <a:schemeClr val="accent1"/>
-            </a:solidFill>
-          </a:ln>
-          <a:extLst>
-            <a:ext uri="{C572A759-6A51-4108-AA02-DFA0A04FC94B}">
-              <ma14:wrappingTextBoxFlag xmlns:ma14="http://schemas.microsoft.com/office/mac/drawingml/2011/main" val="1"/>
-            </a:ext>
-          </a:extLst>
-        </p:spPr>
-        <p:txBody>
-          <a:bodyPr lIns="91423" tIns="91423" rIns="91423" bIns="91423">
-            <a:normAutofit fontScale="100000" lnSpcReduction="0"/>
-          </a:bodyPr>
-          <a:lstStyle/>
-          <a:p>
-            <a:pPr defTabSz="822959">
-              <a:lnSpc>
-                <a:spcPct val="115000"/>
-              </a:lnSpc>
-              <a:defRPr b="1" sz="1619">
-                <a:solidFill>
-                  <a:schemeClr val="accent5"/>
-                </a:solidFill>
-                <a:latin typeface="Lato"/>
-                <a:ea typeface="Lato"/>
-                <a:cs typeface="Lato"/>
-                <a:sym typeface="Lato"/>
-              </a:defRPr>
-            </a:pPr>
-            <a:r>
-              <a:t>framing</a:t>
-            </a:r>
-          </a:p>
-          <a:p>
-            <a:pPr marL="411479" indent="-308609" defTabSz="822959">
-              <a:lnSpc>
-                <a:spcPct val="115000"/>
-              </a:lnSpc>
-              <a:buClr>
-                <a:srgbClr val="000000"/>
-              </a:buClr>
-              <a:buSzPts val="1600"/>
-              <a:buFont typeface="Helvetica"/>
-              <a:buChar char="●"/>
-              <a:defRPr b="1" sz="1619">
-                <a:solidFill>
+        </p:nvGrpSpPr>
+        <p:grpSpPr>
+          <a:xfrm>
+            <a:off x="4138002" y="1037938"/>
+            <a:ext cx="4070437" cy="2988430"/>
+            <a:chOff x="0" y="0"/>
+            <a:chExt cx="4070436" cy="2988429"/>
+          </a:xfrm>
+        </p:grpSpPr>
+        <p:sp>
+          <p:nvSpPr>
+            <p:cNvPr id="198" name="Rectangle"/>
+            <p:cNvSpPr/>
+            <p:nvPr/>
+          </p:nvSpPr>
+          <p:spPr>
+            <a:xfrm>
+              <a:off x="-1" y="-1"/>
+              <a:ext cx="4070438" cy="2988431"/>
+            </a:xfrm>
+            <a:prstGeom prst="rect">
+              <a:avLst/>
+            </a:prstGeom>
+            <a:noFill/>
+            <a:ln w="25400" cap="flat">
+              <a:solidFill>
+                <a:schemeClr val="accent1"/>
+              </a:solidFill>
+              <a:prstDash val="solid"/>
+              <a:round/>
+            </a:ln>
+            <a:effectLst/>
+          </p:spPr>
+          <p:txBody>
+            <a:bodyPr wrap="square" lIns="0" tIns="0" rIns="0" bIns="0" numCol="1" anchor="t">
+              <a:noAutofit/>
+            </a:bodyPr>
+            <a:lstStyle/>
+            <a:p>
+              <a:pPr defTabSz="822958">
+                <a:lnSpc>
+                  <a:spcPct val="115000"/>
+                </a:lnSpc>
+                <a:defRPr b="1" sz="1600">
+                  <a:solidFill>
+                    <a:srgbClr val="000000"/>
+                  </a:solidFill>
+                  <a:latin typeface="Lato"/>
+                  <a:ea typeface="Lato"/>
+                  <a:cs typeface="Lato"/>
+                  <a:sym typeface="Lato"/>
+                </a:defRPr>
+              </a:pPr>
+            </a:p>
+          </p:txBody>
+        </p:sp>
+        <p:sp>
+          <p:nvSpPr>
+            <p:cNvPr id="199" name="framing…"/>
+            <p:cNvSpPr txBox="1"/>
+            <p:nvPr/>
+          </p:nvSpPr>
+          <p:spPr>
+            <a:xfrm>
+              <a:off x="12699" y="12699"/>
+              <a:ext cx="4045038" cy="2963031"/>
+            </a:xfrm>
+            <a:prstGeom prst="rect">
+              <a:avLst/>
+            </a:prstGeom>
+            <a:noFill/>
+            <a:ln w="12700" cap="flat">
+              <a:noFill/>
+              <a:miter lim="400000"/>
+            </a:ln>
+            <a:effectLst/>
+            <a:extLst>
+              <a:ext uri="{C572A759-6A51-4108-AA02-DFA0A04FC94B}">
+                <ma14:wrappingTextBoxFlag xmlns:ma14="http://schemas.microsoft.com/office/mac/drawingml/2011/main" val="1"/>
+              </a:ext>
+            </a:extLst>
+          </p:spPr>
+          <p:txBody>
+            <a:bodyPr wrap="square" lIns="91422" tIns="91422" rIns="91422" bIns="91422" numCol="1" anchor="t">
+              <a:normAutofit fontScale="100000" lnSpcReduction="0"/>
+            </a:bodyPr>
+            <a:lstStyle/>
+            <a:p>
+              <a:pPr defTabSz="822958">
+                <a:lnSpc>
+                  <a:spcPct val="115000"/>
+                </a:lnSpc>
+                <a:defRPr b="1" sz="1600">
+                  <a:solidFill>
+                    <a:schemeClr val="accent5"/>
+                  </a:solidFill>
+                  <a:latin typeface="Lato"/>
+                  <a:ea typeface="Lato"/>
+                  <a:cs typeface="Lato"/>
+                  <a:sym typeface="Lato"/>
+                </a:defRPr>
+              </a:pPr>
+              <a:r>
+                <a:t>framing</a:t>
+              </a:r>
+            </a:p>
+            <a:p>
+              <a:pPr marL="411479" indent="-308608" defTabSz="822958">
+                <a:lnSpc>
+                  <a:spcPct val="115000"/>
+                </a:lnSpc>
+                <a:buClr>
                   <a:srgbClr val="000000"/>
-                </a:solidFill>
-                <a:latin typeface="Lato"/>
-                <a:ea typeface="Lato"/>
-                <a:cs typeface="Lato"/>
-                <a:sym typeface="Lato"/>
-              </a:defRPr>
-            </a:pPr>
-            <a:r>
-              <a:t>what: </a:t>
-            </a:r>
-            <a:r>
-              <a:rPr b="0"/>
-              <a:t> use Gaussian elimination to solve multivariate systems of equations</a:t>
-            </a:r>
-            <a:endParaRPr b="0"/>
-          </a:p>
-          <a:p>
-            <a:pPr marL="411479" indent="-308609" defTabSz="822959">
-              <a:lnSpc>
-                <a:spcPct val="115000"/>
-              </a:lnSpc>
-              <a:buClr>
-                <a:srgbClr val="000000"/>
-              </a:buClr>
-              <a:buSzPts val="1600"/>
-              <a:buFont typeface="Helvetica"/>
-              <a:buChar char="●"/>
-              <a:defRPr b="1" sz="1619">
-                <a:solidFill>
+                </a:buClr>
+                <a:buSzPts val="1600"/>
+                <a:buFont typeface="Helvetica"/>
+                <a:buChar char="●"/>
+                <a:defRPr b="1" sz="1600">
+                  <a:solidFill>
+                    <a:srgbClr val="000000"/>
+                  </a:solidFill>
+                  <a:latin typeface="Lato"/>
+                  <a:ea typeface="Lato"/>
+                  <a:cs typeface="Lato"/>
+                  <a:sym typeface="Lato"/>
+                </a:defRPr>
+              </a:pPr>
+              <a:r>
+                <a:t>what: </a:t>
+              </a:r>
+              <a:r>
+                <a:rPr b="0"/>
+                <a:t> use Gaussian elimination to solve multivariate systems of equations</a:t>
+              </a:r>
+            </a:p>
+            <a:p>
+              <a:pPr marL="411479" indent="-308608" defTabSz="822958">
+                <a:lnSpc>
+                  <a:spcPct val="115000"/>
+                </a:lnSpc>
+                <a:buClr>
                   <a:srgbClr val="000000"/>
-                </a:solidFill>
-                <a:latin typeface="Lato"/>
-                <a:ea typeface="Lato"/>
-                <a:cs typeface="Lato"/>
-                <a:sym typeface="Lato"/>
-              </a:defRPr>
-            </a:pPr>
-            <a:r>
-              <a:t>why: </a:t>
-            </a:r>
-            <a:r>
-              <a:rPr b="0"/>
-              <a:t>Gaussian elimination is a powerful method for solving systems of equations. It’s what computers use.</a:t>
-            </a:r>
-            <a:endParaRPr b="0"/>
-          </a:p>
-          <a:p>
-            <a:pPr marL="411479" indent="-308609" defTabSz="822959">
-              <a:lnSpc>
-                <a:spcPct val="115000"/>
-              </a:lnSpc>
-              <a:buClr>
-                <a:srgbClr val="000000"/>
-              </a:buClr>
-              <a:buSzPts val="1600"/>
-              <a:buFont typeface="Helvetica"/>
-              <a:buChar char="●"/>
-              <a:defRPr b="1" sz="1619">
-                <a:solidFill>
+                </a:buClr>
+                <a:buSzPts val="1600"/>
+                <a:buFont typeface="Helvetica"/>
+                <a:buChar char="●"/>
+                <a:defRPr b="1" sz="1600">
+                  <a:solidFill>
+                    <a:srgbClr val="000000"/>
+                  </a:solidFill>
+                  <a:latin typeface="Lato"/>
+                  <a:ea typeface="Lato"/>
+                  <a:cs typeface="Lato"/>
+                  <a:sym typeface="Lato"/>
+                </a:defRPr>
+              </a:pPr>
+              <a:r>
+                <a:t>why: </a:t>
+              </a:r>
+              <a:r>
+                <a:rPr b="0"/>
+                <a:t>Gaussian elimination is a powerful method for solving systems of equations. It’s what computers use.</a:t>
+              </a:r>
+            </a:p>
+            <a:p>
+              <a:pPr marL="411479" indent="-308608" defTabSz="822958">
+                <a:lnSpc>
+                  <a:spcPct val="115000"/>
+                </a:lnSpc>
+                <a:buClr>
                   <a:srgbClr val="000000"/>
-                </a:solidFill>
-                <a:latin typeface="Lato"/>
-                <a:ea typeface="Lato"/>
-                <a:cs typeface="Lato"/>
-                <a:sym typeface="Lato"/>
-              </a:defRPr>
-            </a:pPr>
-            <a:r>
-              <a:t>where to: </a:t>
-            </a:r>
-            <a:r>
-              <a:rPr b="0"/>
-              <a:t>representing systems of equations as matrices</a:t>
-            </a:r>
-          </a:p>
-        </p:txBody>
-      </p:sp>
+                </a:buClr>
+                <a:buSzPts val="1600"/>
+                <a:buFont typeface="Helvetica"/>
+                <a:buChar char="●"/>
+                <a:defRPr b="1" sz="1600">
+                  <a:solidFill>
+                    <a:srgbClr val="000000"/>
+                  </a:solidFill>
+                  <a:latin typeface="Lato"/>
+                  <a:ea typeface="Lato"/>
+                  <a:cs typeface="Lato"/>
+                  <a:sym typeface="Lato"/>
+                </a:defRPr>
+              </a:pPr>
+              <a:r>
+                <a:t>where to: </a:t>
+              </a:r>
+              <a:r>
+                <a:rPr b="0"/>
+                <a:t>representing systems of equations as matrices</a:t>
+              </a:r>
+            </a:p>
+          </p:txBody>
+        </p:sp>
+      </p:grpSp>
       <p:pic>
         <p:nvPicPr>
-          <p:cNvPr id="199" name="Image" descr="Image"/>
+          <p:cNvPr id="201" name="Image" descr="Image"/>
           <p:cNvPicPr>
             <a:picLocks noChangeAspect="1"/>
           </p:cNvPicPr>
@@ -7252,7 +7315,7 @@
         <p:spPr>
           <a:xfrm>
             <a:off x="239993" y="1497277"/>
-            <a:ext cx="3352801" cy="2425701"/>
+            <a:ext cx="3352802" cy="2425701"/>
           </a:xfrm>
           <a:prstGeom prst="rect">
             <a:avLst/>
@@ -7301,183 +7364,7 @@
                                       <p:cBhvr>
                                         <p:cTn id="6" fill="hold"/>
                                         <p:tgtEl>
-                                          <p:spTgt spid="198">
-                                            <p:bg/>
-                                          </p:spTgt>
-                                        </p:tgtEl>
-                                        <p:attrNameLst>
-                                          <p:attrName>style.visibility</p:attrName>
-                                        </p:attrNameLst>
-                                      </p:cBhvr>
-                                      <p:to>
-                                        <p:strVal val="visible"/>
-                                      </p:to>
-                                    </p:set>
-                                  </p:childTnLst>
-                                </p:cTn>
-                              </p:par>
-                              <p:par>
-                                <p:cTn id="7" presetClass="entr" nodeType="withEffect" presetSubtype="0" presetID="1" grpId="1" fill="hold">
-                                  <p:stCondLst>
-                                    <p:cond delay="0"/>
-                                  </p:stCondLst>
-                                  <p:iterate type="el" backwards="0">
-                                    <p:tmAbs val="0"/>
-                                  </p:iterate>
-                                  <p:childTnLst>
-                                    <p:set>
-                                      <p:cBhvr>
-                                        <p:cTn id="8" fill="hold"/>
-                                        <p:tgtEl>
-                                          <p:spTgt spid="198">
-                                            <p:txEl>
-                                              <p:pRg st="0" end="0"/>
-                                            </p:txEl>
-                                          </p:spTgt>
-                                        </p:tgtEl>
-                                        <p:attrNameLst>
-                                          <p:attrName>style.visibility</p:attrName>
-                                        </p:attrNameLst>
-                                      </p:cBhvr>
-                                      <p:to>
-                                        <p:strVal val="visible"/>
-                                      </p:to>
-                                    </p:set>
-                                  </p:childTnLst>
-                                </p:cTn>
-                              </p:par>
-                            </p:childTnLst>
-                          </p:cTn>
-                        </p:par>
-                      </p:childTnLst>
-                    </p:cTn>
-                  </p:par>
-                  <p:par>
-                    <p:cTn id="9" fill="hold">
-                      <p:stCondLst>
-                        <p:cond delay="indefinite"/>
-                      </p:stCondLst>
-                      <p:childTnLst>
-                        <p:par>
-                          <p:cTn id="10" fill="hold">
-                            <p:stCondLst>
-                              <p:cond delay="0"/>
-                            </p:stCondLst>
-                            <p:childTnLst>
-                              <p:par>
-                                <p:cTn id="11" presetClass="entr" nodeType="clickEffect" presetSubtype="0" presetID="1" grpId="1" fill="hold">
-                                  <p:stCondLst>
-                                    <p:cond delay="0"/>
-                                  </p:stCondLst>
-                                  <p:iterate type="el" backwards="0">
-                                    <p:tmAbs val="0"/>
-                                  </p:iterate>
-                                  <p:childTnLst>
-                                    <p:set>
-                                      <p:cBhvr>
-                                        <p:cTn id="12" fill="hold"/>
-                                        <p:tgtEl>
-                                          <p:spTgt spid="198">
-                                            <p:txEl>
-                                              <p:pRg st="1" end="1"/>
-                                            </p:txEl>
-                                          </p:spTgt>
-                                        </p:tgtEl>
-                                        <p:attrNameLst>
-                                          <p:attrName>style.visibility</p:attrName>
-                                        </p:attrNameLst>
-                                      </p:cBhvr>
-                                      <p:to>
-                                        <p:strVal val="visible"/>
-                                      </p:to>
-                                    </p:set>
-                                  </p:childTnLst>
-                                </p:cTn>
-                              </p:par>
-                            </p:childTnLst>
-                          </p:cTn>
-                        </p:par>
-                      </p:childTnLst>
-                    </p:cTn>
-                  </p:par>
-                  <p:par>
-                    <p:cTn id="13" fill="hold">
-                      <p:stCondLst>
-                        <p:cond delay="indefinite"/>
-                      </p:stCondLst>
-                      <p:childTnLst>
-                        <p:par>
-                          <p:cTn id="14" fill="hold">
-                            <p:stCondLst>
-                              <p:cond delay="0"/>
-                            </p:stCondLst>
-                            <p:childTnLst>
-                              <p:par>
-                                <p:cTn id="15" presetClass="entr" nodeType="clickEffect" presetSubtype="0" presetID="1" grpId="1" fill="hold">
-                                  <p:stCondLst>
-                                    <p:cond delay="0"/>
-                                  </p:stCondLst>
-                                  <p:iterate type="el" backwards="0">
-                                    <p:tmAbs val="0"/>
-                                  </p:iterate>
-                                  <p:childTnLst>
-                                    <p:set>
-                                      <p:cBhvr>
-                                        <p:cTn id="16" fill="hold"/>
-                                        <p:tgtEl>
-                                          <p:spTgt spid="198">
-                                            <p:txEl>
-                                              <p:pRg st="2" end="2"/>
-                                            </p:txEl>
-                                          </p:spTgt>
-                                        </p:tgtEl>
-                                        <p:attrNameLst>
-                                          <p:attrName>style.visibility</p:attrName>
-                                        </p:attrNameLst>
-                                      </p:cBhvr>
-                                      <p:to>
-                                        <p:strVal val="visible"/>
-                                      </p:to>
-                                    </p:set>
-                                  </p:childTnLst>
-                                </p:cTn>
-                              </p:par>
-                            </p:childTnLst>
-                          </p:cTn>
-                        </p:par>
-                      </p:childTnLst>
-                    </p:cTn>
-                  </p:par>
-                  <p:par>
-                    <p:cTn id="17" fill="hold">
-                      <p:stCondLst>
-                        <p:cond delay="indefinite"/>
-                      </p:stCondLst>
-                      <p:childTnLst>
-                        <p:par>
-                          <p:cTn id="18" fill="hold">
-                            <p:stCondLst>
-                              <p:cond delay="0"/>
-                            </p:stCondLst>
-                            <p:childTnLst>
-                              <p:par>
-                                <p:cTn id="19" presetClass="entr" nodeType="clickEffect" presetSubtype="0" presetID="1" grpId="1" fill="hold">
-                                  <p:stCondLst>
-                                    <p:cond delay="0"/>
-                                  </p:stCondLst>
-                                  <p:iterate type="el" backwards="0">
-                                    <p:tmAbs val="0"/>
-                                  </p:iterate>
-                                  <p:childTnLst>
-                                    <p:set>
-                                      <p:cBhvr>
-                                        <p:cTn id="20" fill="hold"/>
-                                        <p:tgtEl>
-                                          <p:spTgt spid="198">
-                                            <p:txEl>
-                                              <p:pRg st="3" end="3"/>
-                                            </p:txEl>
-                                          </p:spTgt>
+                                          <p:spTgt spid="200"/>
                                         </p:tgtEl>
                                         <p:attrNameLst>
                                           <p:attrName>style.visibility</p:attrName>
@@ -7518,7 +7405,7 @@
       </p:par>
     </p:tnLst>
     <p:bldLst>
-      <p:bldP build="p" bldLvl="5" animBg="1" rev="0" advAuto="0" spid="198" grpId="1"/>
+      <p:bldP build="whole" bldLvl="1" animBg="1" rev="0" advAuto="0" spid="200" grpId="1"/>
     </p:bldLst>
   </p:timing>
 </p:sld>
@@ -7543,7 +7430,7 @@
       </p:grpSpPr>
       <p:sp>
         <p:nvSpPr>
-          <p:cNvPr id="201" name="Row-echelon form (review)"/>
+          <p:cNvPr id="203" name="Row-echelon form (review)"/>
           <p:cNvSpPr txBox="1"/>
           <p:nvPr>
             <p:ph type="title"/>
@@ -7551,8 +7438,8 @@
         </p:nvSpPr>
         <p:spPr>
           <a:xfrm>
-            <a:off x="2316666" y="529596"/>
-            <a:ext cx="6321602" cy="635402"/>
+            <a:off x="2316665" y="529596"/>
+            <a:ext cx="6321604" cy="635403"/>
           </a:xfrm>
           <a:prstGeom prst="rect">
             <a:avLst/>
@@ -7561,8 +7448,8 @@
         <p:txBody>
           <a:bodyPr/>
           <a:lstStyle>
-            <a:lvl1pPr defTabSz="886968">
-              <a:defRPr sz="2910"/>
+            <a:lvl1pPr defTabSz="886967">
+              <a:defRPr sz="2900"/>
             </a:lvl1pPr>
           </a:lstStyle>
           <a:p>
@@ -7575,13 +7462,13 @@
       </p:sp>
       <p:sp>
         <p:nvSpPr>
-          <p:cNvPr id="202" name="A system is in row-echelon form if it has a stair-step pattern and each equation has a leading coefficient of 1."/>
+          <p:cNvPr id="204" name="A system is in row-echelon form if it has a stair-step pattern and each equation has a leading coefficient of 1."/>
           <p:cNvSpPr txBox="1"/>
           <p:nvPr/>
         </p:nvSpPr>
         <p:spPr>
           <a:xfrm>
-            <a:off x="490376" y="3549264"/>
+            <a:off x="490376" y="3549263"/>
             <a:ext cx="7890710" cy="431801"/>
           </a:xfrm>
           <a:prstGeom prst="rect">
@@ -7602,7 +7489,14 @@
           </a:bodyPr>
           <a:lstStyle/>
           <a:p>
-            <a:pPr/>
+            <a:pPr>
+              <a:defRPr>
+                <a:latin typeface="+mj-lt"/>
+                <a:ea typeface="+mj-ea"/>
+                <a:cs typeface="+mj-cs"/>
+                <a:sym typeface="Helvetica"/>
+              </a:defRPr>
+            </a:pPr>
             <a:r>
               <a:t>A system is in </a:t>
             </a:r>
@@ -7624,14 +7518,14 @@
       </p:sp>
       <p:sp>
         <p:nvSpPr>
-          <p:cNvPr id="203" name="To solve systems with more than two variables, we want to transform the system into row-echelon form:"/>
+          <p:cNvPr id="205" name="To solve systems with more than two variables, we want to transform the system into row-echelon form:"/>
           <p:cNvSpPr txBox="1"/>
           <p:nvPr/>
         </p:nvSpPr>
         <p:spPr>
           <a:xfrm>
-            <a:off x="1126148" y="1266197"/>
-            <a:ext cx="7247025" cy="431801"/>
+            <a:off x="1126147" y="1266197"/>
+            <a:ext cx="7247027" cy="431801"/>
           </a:xfrm>
           <a:prstGeom prst="rect">
             <a:avLst/>
@@ -7656,6 +7550,10 @@
                 <a:solidFill>
                   <a:srgbClr val="000000"/>
                 </a:solidFill>
+                <a:latin typeface="+mj-lt"/>
+                <a:ea typeface="+mj-ea"/>
+                <a:cs typeface="+mj-cs"/>
+                <a:sym typeface="Helvetica"/>
               </a:defRPr>
             </a:pPr>
             <a:r>
@@ -7670,7 +7568,7 @@
       </p:sp>
       <p:pic>
         <p:nvPicPr>
-          <p:cNvPr id="204" name="Image" descr="Image"/>
+          <p:cNvPr id="206" name="Image" descr="Image"/>
           <p:cNvPicPr>
             <a:picLocks noChangeAspect="1"/>
           </p:cNvPicPr>
@@ -7699,7 +7597,7 @@
       </p:pic>
       <p:pic>
         <p:nvPicPr>
-          <p:cNvPr id="205" name="Image" descr="Image"/>
+          <p:cNvPr id="207" name="Image" descr="Image"/>
           <p:cNvPicPr>
             <a:picLocks noChangeAspect="1"/>
           </p:cNvPicPr>
@@ -7716,7 +7614,7 @@
         <p:spPr>
           <a:xfrm>
             <a:off x="4679796" y="1752843"/>
-            <a:ext cx="2973145" cy="1189258"/>
+            <a:ext cx="2973146" cy="1189259"/>
           </a:xfrm>
           <a:prstGeom prst="rect">
             <a:avLst/>
@@ -7765,7 +7663,7 @@
                                       <p:cBhvr>
                                         <p:cTn id="6" fill="hold"/>
                                         <p:tgtEl>
-                                          <p:spTgt spid="204"/>
+                                          <p:spTgt spid="206"/>
                                         </p:tgtEl>
                                         <p:attrNameLst>
                                           <p:attrName>style.visibility</p:attrName>
@@ -7809,7 +7707,7 @@
                                       <p:cBhvr>
                                         <p:cTn id="10" fill="hold"/>
                                         <p:tgtEl>
-                                          <p:spTgt spid="205"/>
+                                          <p:spTgt spid="207"/>
                                         </p:tgtEl>
                                         <p:attrNameLst>
                                           <p:attrName>style.visibility</p:attrName>
@@ -7853,7 +7751,7 @@
                                       <p:cBhvr>
                                         <p:cTn id="14" fill="hold"/>
                                         <p:tgtEl>
-                                          <p:spTgt spid="202"/>
+                                          <p:spTgt spid="204"/>
                                         </p:tgtEl>
                                         <p:attrNameLst>
                                           <p:attrName>style.visibility</p:attrName>
@@ -7894,9 +7792,9 @@
       </p:par>
     </p:tnLst>
     <p:bldLst>
-      <p:bldP build="whole" bldLvl="1" animBg="1" rev="0" advAuto="0" spid="205" grpId="2"/>
-      <p:bldP build="whole" bldLvl="1" animBg="1" rev="0" advAuto="0" spid="204" grpId="1"/>
-      <p:bldP build="whole" bldLvl="1" animBg="1" rev="0" advAuto="0" spid="202" grpId="3"/>
+      <p:bldP build="whole" bldLvl="1" animBg="1" rev="0" advAuto="0" spid="207" grpId="2"/>
+      <p:bldP build="whole" bldLvl="1" animBg="1" rev="0" advAuto="0" spid="204" grpId="3"/>
+      <p:bldP build="whole" bldLvl="1" animBg="1" rev="0" advAuto="0" spid="206" grpId="1"/>
     </p:bldLst>
   </p:timing>
 </p:sld>
@@ -7921,13 +7819,17 @@
       </p:grpSpPr>
       <p:sp>
         <p:nvSpPr>
-          <p:cNvPr id="207" name="Row operations (review)"/>
+          <p:cNvPr id="209" name="Row operations (review)"/>
           <p:cNvSpPr txBox="1"/>
           <p:nvPr>
             <p:ph type="title"/>
           </p:nvPr>
         </p:nvSpPr>
         <p:spPr>
+          <a:xfrm>
+            <a:off x="2400250" y="575950"/>
+            <a:ext cx="6321601" cy="635403"/>
+          </a:xfrm>
           <a:prstGeom prst="rect">
             <a:avLst/>
           </a:prstGeom>
@@ -7935,8 +7837,8 @@
         <p:txBody>
           <a:bodyPr/>
           <a:lstStyle>
-            <a:lvl1pPr defTabSz="886968">
-              <a:defRPr sz="2910"/>
+            <a:lvl1pPr defTabSz="886967">
+              <a:defRPr sz="2900"/>
             </a:lvl1pPr>
           </a:lstStyle>
           <a:p>
@@ -7949,14 +7851,14 @@
       </p:sp>
       <p:sp>
         <p:nvSpPr>
-          <p:cNvPr id="208" name="Exchange equations…"/>
+          <p:cNvPr id="210" name="Exchange equations…"/>
           <p:cNvSpPr txBox="1"/>
           <p:nvPr/>
         </p:nvSpPr>
         <p:spPr>
           <a:xfrm>
-            <a:off x="1259341" y="1877600"/>
-            <a:ext cx="4734531" cy="863601"/>
+            <a:off x="1259340" y="1877599"/>
+            <a:ext cx="4734533" cy="863601"/>
           </a:xfrm>
           <a:prstGeom prst="rect">
             <a:avLst/>
@@ -7976,7 +7878,7 @@
           </a:bodyPr>
           <a:lstStyle/>
           <a:p>
-            <a:pPr marL="187157" indent="-187157">
+            <a:pPr marL="187156" indent="-187156">
               <a:buSzPct val="100000"/>
               <a:buAutoNum type="arabicPeriod" startAt="1"/>
               <a:defRPr>
@@ -7985,6 +7887,10 @@
                     <a:lumOff val="-9098"/>
                   </a:schemeClr>
                 </a:solidFill>
+                <a:latin typeface="+mj-lt"/>
+                <a:ea typeface="+mj-ea"/>
+                <a:cs typeface="+mj-cs"/>
+                <a:sym typeface="Helvetica"/>
               </a:defRPr>
             </a:pPr>
             <a:r>
@@ -7992,7 +7898,7 @@
             </a:r>
           </a:p>
           <a:p>
-            <a:pPr marL="187157" indent="-187157">
+            <a:pPr marL="187156" indent="-187156">
               <a:buSzPct val="100000"/>
               <a:buAutoNum type="arabicPeriod" startAt="1"/>
               <a:defRPr>
@@ -8001,6 +7907,10 @@
                     <a:lumOff val="-9098"/>
                   </a:schemeClr>
                 </a:solidFill>
+                <a:latin typeface="+mj-lt"/>
+                <a:ea typeface="+mj-ea"/>
+                <a:cs typeface="+mj-cs"/>
+                <a:sym typeface="Helvetica"/>
               </a:defRPr>
             </a:pPr>
             <a:r>
@@ -8008,7 +7918,7 @@
             </a:r>
           </a:p>
           <a:p>
-            <a:pPr marL="187157" indent="-187157">
+            <a:pPr marL="187156" indent="-187156">
               <a:buSzPct val="100000"/>
               <a:buAutoNum type="arabicPeriod" startAt="1"/>
               <a:defRPr>
@@ -8017,6 +7927,10 @@
                     <a:lumOff val="-9098"/>
                   </a:schemeClr>
                 </a:solidFill>
+                <a:latin typeface="+mj-lt"/>
+                <a:ea typeface="+mj-ea"/>
+                <a:cs typeface="+mj-cs"/>
+                <a:sym typeface="Helvetica"/>
               </a:defRPr>
             </a:pPr>
             <a:r>
@@ -8027,14 +7941,14 @@
       </p:sp>
       <p:sp>
         <p:nvSpPr>
-          <p:cNvPr id="209" name="Gaussian elimination involves three row operations:"/>
+          <p:cNvPr id="211" name="Gaussian elimination involves three row operations:"/>
           <p:cNvSpPr txBox="1"/>
           <p:nvPr/>
         </p:nvSpPr>
         <p:spPr>
           <a:xfrm>
-            <a:off x="1126148" y="1266197"/>
-            <a:ext cx="7247025" cy="215901"/>
+            <a:off x="1126147" y="1266197"/>
+            <a:ext cx="7247027" cy="215901"/>
           </a:xfrm>
           <a:prstGeom prst="rect">
             <a:avLst/>
@@ -8059,6 +7973,10 @@
                 <a:solidFill>
                   <a:srgbClr val="000000"/>
                 </a:solidFill>
+                <a:latin typeface="+mj-lt"/>
+                <a:ea typeface="+mj-ea"/>
+                <a:cs typeface="+mj-cs"/>
+                <a:sym typeface="Helvetica"/>
               </a:defRPr>
             </a:pPr>
             <a:r>
@@ -8081,21 +7999,21 @@
       </p:sp>
       <p:grpSp>
         <p:nvGrpSpPr>
-          <p:cNvPr id="212" name="Group"/>
+          <p:cNvPr id="216" name="Group"/>
           <p:cNvGrpSpPr/>
           <p:nvPr/>
         </p:nvGrpSpPr>
         <p:grpSpPr>
           <a:xfrm>
             <a:off x="6247433" y="1721011"/>
-            <a:ext cx="2133601" cy="2862296"/>
+            <a:ext cx="2133601" cy="2862298"/>
             <a:chOff x="0" y="0"/>
-            <a:chExt cx="2133600" cy="2862294"/>
+            <a:chExt cx="2133600" cy="2862296"/>
           </a:xfrm>
         </p:grpSpPr>
         <p:pic>
           <p:nvPicPr>
-            <p:cNvPr id="210" name="Unknown.jpeg" descr="Unknown.jpeg"/>
+            <p:cNvPr id="212" name="Unknown.jpeg" descr="Unknown.jpeg"/>
             <p:cNvPicPr>
               <a:picLocks noChangeAspect="1"/>
             </p:cNvPicPr>
@@ -8112,7 +8030,7 @@
           <p:spPr>
             <a:xfrm>
               <a:off x="205956" y="0"/>
-              <a:ext cx="1721688" cy="2011395"/>
+              <a:ext cx="1721689" cy="2011397"/>
             </a:xfrm>
             <a:prstGeom prst="rect">
               <a:avLst/>
@@ -8124,51 +8042,113 @@
             <a:effectLst/>
           </p:spPr>
         </p:pic>
-        <p:sp>
-          <p:nvSpPr>
-            <p:cNvPr id="211" name="Caption"/>
-            <p:cNvSpPr/>
+        <p:grpSp>
+          <p:nvGrpSpPr>
+            <p:cNvPr id="215" name="Caption"/>
+            <p:cNvGrpSpPr/>
             <p:nvPr/>
-          </p:nvSpPr>
-          <p:spPr>
+          </p:nvGrpSpPr>
+          <p:grpSpPr>
             <a:xfrm>
-              <a:off x="0" y="2112994"/>
-              <a:ext cx="2133600" cy="749301"/>
+              <a:off x="0" y="2112995"/>
+              <a:ext cx="2133601" cy="749302"/>
+              <a:chOff x="0" y="0"/>
+              <a:chExt cx="2133600" cy="749301"/>
             </a:xfrm>
-            <a:prstGeom prst="roundRect">
-              <a:avLst>
-                <a:gd name="adj" fmla="val 0"/>
-              </a:avLst>
-            </a:prstGeom>
-            <a:solidFill>
-              <a:srgbClr val="000000">
-                <a:alpha val="0"/>
-              </a:srgbClr>
-            </a:solidFill>
-            <a:ln w="12700" cap="flat">
+          </p:grpSpPr>
+          <p:sp>
+            <p:nvSpPr>
+              <p:cNvPr id="213" name="Rectangle"/>
+              <p:cNvSpPr/>
+              <p:nvPr/>
+            </p:nvSpPr>
+            <p:spPr>
+              <a:xfrm>
+                <a:off x="0" y="0"/>
+                <a:ext cx="2133601" cy="749302"/>
+              </a:xfrm>
+              <a:prstGeom prst="roundRect">
+                <a:avLst>
+                  <a:gd name="adj" fmla="val 0"/>
+                </a:avLst>
+              </a:prstGeom>
+              <a:solidFill>
+                <a:srgbClr val="000000">
+                  <a:alpha val="0"/>
+                </a:srgbClr>
+              </a:solidFill>
+              <a:ln w="12700" cap="flat">
+                <a:noFill/>
+                <a:miter lim="400000"/>
+              </a:ln>
+              <a:effectLst/>
+            </p:spPr>
+            <p:txBody>
+              <a:bodyPr wrap="square" lIns="0" tIns="0" rIns="0" bIns="0" numCol="1" anchor="t">
+                <a:noAutofit/>
+              </a:bodyPr>
+              <a:lstStyle/>
+              <a:p>
+                <a:pPr>
+                  <a:defRPr>
+                    <a:latin typeface="+mj-lt"/>
+                    <a:ea typeface="+mj-ea"/>
+                    <a:cs typeface="+mj-cs"/>
+                    <a:sym typeface="Helvetica"/>
+                  </a:defRPr>
+                </a:pPr>
+              </a:p>
+            </p:txBody>
+          </p:sp>
+          <p:sp>
+            <p:nvSpPr>
+              <p:cNvPr id="214" name="Johann Gauss, the guy who came up with this algorithm"/>
+              <p:cNvSpPr txBox="1"/>
+              <p:nvPr/>
+            </p:nvSpPr>
+            <p:spPr>
+              <a:xfrm>
+                <a:off x="0" y="-1"/>
+                <a:ext cx="2133601" cy="749301"/>
+              </a:xfrm>
+              <a:prstGeom prst="rect">
+                <a:avLst/>
+              </a:prstGeom>
               <a:noFill/>
-              <a:miter lim="400000"/>
-            </a:ln>
-            <a:effectLst/>
-            <a:extLst>
-              <a:ext uri="{C572A759-6A51-4108-AA02-DFA0A04FC94B}">
-                <ma14:wrappingTextBoxFlag xmlns:ma14="http://schemas.microsoft.com/office/mac/drawingml/2011/main" val="1"/>
-              </a:ext>
-            </a:extLst>
-          </p:spPr>
-          <p:txBody>
-            <a:bodyPr wrap="square" lIns="50800" tIns="50800" rIns="50800" bIns="50800" numCol="1" anchor="t">
-              <a:noAutofit/>
-            </a:bodyPr>
-            <a:lstStyle/>
-            <a:p>
-              <a:pPr/>
-              <a:r>
-                <a:t>Johann Gauss, the guy who came up with this algorithm</a:t>
-              </a:r>
-            </a:p>
-          </p:txBody>
-        </p:sp>
+              <a:ln w="12700" cap="flat">
+                <a:noFill/>
+                <a:miter lim="400000"/>
+              </a:ln>
+              <a:effectLst/>
+              <a:extLst>
+                <a:ext uri="{C572A759-6A51-4108-AA02-DFA0A04FC94B}">
+                  <ma14:wrappingTextBoxFlag xmlns:ma14="http://schemas.microsoft.com/office/mac/drawingml/2011/main" val="1"/>
+                </a:ext>
+              </a:extLst>
+            </p:spPr>
+            <p:txBody>
+              <a:bodyPr wrap="square" lIns="50800" tIns="50800" rIns="50800" bIns="50800" numCol="1" anchor="t">
+                <a:spAutoFit/>
+              </a:bodyPr>
+              <a:lstStyle>
+                <a:lvl1pPr>
+                  <a:defRPr>
+                    <a:latin typeface="+mj-lt"/>
+                    <a:ea typeface="+mj-ea"/>
+                    <a:cs typeface="+mj-cs"/>
+                    <a:sym typeface="Helvetica"/>
+                  </a:defRPr>
+                </a:lvl1pPr>
+              </a:lstStyle>
+              <a:p>
+                <a:pPr/>
+                <a:r>
+                  <a:t>Johann Gauss, the guy who came up with this algorithm</a:t>
+                </a:r>
+              </a:p>
+            </p:txBody>
+          </p:sp>
+        </p:grpSp>
       </p:grpSp>
     </p:spTree>
   </p:cSld>
@@ -8209,7 +8189,7 @@
                                       <p:cBhvr>
                                         <p:cTn id="6" fill="hold"/>
                                         <p:tgtEl>
-                                          <p:spTgt spid="208">
+                                          <p:spTgt spid="210">
                                             <p:bg/>
                                           </p:spTgt>
                                         </p:tgtEl>
@@ -8237,7 +8217,7 @@
                                       <p:cBhvr>
                                         <p:cTn id="8" fill="hold"/>
                                         <p:tgtEl>
-                                          <p:spTgt spid="208">
+                                          <p:spTgt spid="210">
                                             <p:txEl>
                                               <p:pRg st="0" end="0"/>
                                             </p:txEl>
@@ -8257,23 +8237,14 @@
                             </p:childTnLst>
                           </p:cTn>
                         </p:par>
-                      </p:childTnLst>
-                    </p:cTn>
-                  </p:par>
-                  <p:par>
-                    <p:cTn id="9" fill="hold">
-                      <p:stCondLst>
-                        <p:cond delay="indefinite"/>
-                      </p:stCondLst>
-                      <p:childTnLst>
                         <p:par>
-                          <p:cTn id="10" fill="hold">
+                          <p:cTn id="9" fill="hold">
                             <p:stCondLst>
                               <p:cond delay="0"/>
                             </p:stCondLst>
                             <p:childTnLst>
                               <p:par>
-                                <p:cTn id="11" presetClass="entr" nodeType="clickEffect" presetSubtype="0" presetID="1" grpId="1" fill="hold">
+                                <p:cTn id="10" presetClass="entr" nodeType="afterEffect" presetSubtype="0" presetID="1" grpId="1" fill="hold">
                                   <p:stCondLst>
                                     <p:cond delay="0"/>
                                   </p:stCondLst>
@@ -8283,9 +8254,9 @@
                                   <p:childTnLst>
                                     <p:set>
                                       <p:cBhvr>
-                                        <p:cTn id="12" fill="hold"/>
+                                        <p:cTn id="11" fill="hold"/>
                                         <p:tgtEl>
-                                          <p:spTgt spid="208">
+                                          <p:spTgt spid="210">
                                             <p:txEl>
                                               <p:pRg st="1" end="1"/>
                                             </p:txEl>
@@ -8309,19 +8280,19 @@
                     </p:cTn>
                   </p:par>
                   <p:par>
-                    <p:cTn id="13" fill="hold">
+                    <p:cTn id="12" fill="hold">
                       <p:stCondLst>
                         <p:cond delay="indefinite"/>
                       </p:stCondLst>
                       <p:childTnLst>
                         <p:par>
-                          <p:cTn id="14" fill="hold">
+                          <p:cTn id="13" fill="hold">
                             <p:stCondLst>
                               <p:cond delay="0"/>
                             </p:stCondLst>
                             <p:childTnLst>
                               <p:par>
-                                <p:cTn id="15" presetClass="entr" nodeType="clickEffect" presetSubtype="0" presetID="1" grpId="1" fill="hold">
+                                <p:cTn id="14" presetClass="entr" nodeType="clickEffect" presetSubtype="0" presetID="1" grpId="1" fill="hold">
                                   <p:stCondLst>
                                     <p:cond delay="0"/>
                                   </p:stCondLst>
@@ -8331,9 +8302,9 @@
                                   <p:childTnLst>
                                     <p:set>
                                       <p:cBhvr>
-                                        <p:cTn id="16" fill="hold"/>
+                                        <p:cTn id="15" fill="hold"/>
                                         <p:tgtEl>
-                                          <p:spTgt spid="208">
+                                          <p:spTgt spid="210">
                                             <p:txEl>
                                               <p:pRg st="2" end="2"/>
                                             </p:txEl>
@@ -8378,7 +8349,7 @@
       </p:par>
     </p:tnLst>
     <p:bldLst>
-      <p:bldP build="p" bldLvl="5" animBg="1" rev="0" advAuto="0" spid="208" grpId="1"/>
+      <p:bldP build="p" bldLvl="5" animBg="1" rev="0" advAuto="0" spid="210" grpId="1"/>
     </p:bldLst>
   </p:timing>
 </p:sld>
@@ -8403,13 +8374,17 @@
       </p:grpSpPr>
       <p:sp>
         <p:nvSpPr>
-          <p:cNvPr id="214" name="Warm up"/>
+          <p:cNvPr id="218" name="Warm up"/>
           <p:cNvSpPr txBox="1"/>
           <p:nvPr>
             <p:ph type="title"/>
           </p:nvPr>
         </p:nvSpPr>
         <p:spPr>
+          <a:xfrm>
+            <a:off x="2400250" y="575950"/>
+            <a:ext cx="6321601" cy="635403"/>
+          </a:xfrm>
           <a:prstGeom prst="rect">
             <a:avLst/>
           </a:prstGeom>
@@ -8417,8 +8392,8 @@
         <p:txBody>
           <a:bodyPr/>
           <a:lstStyle>
-            <a:lvl1pPr defTabSz="886968">
-              <a:defRPr sz="2910"/>
+            <a:lvl1pPr defTabSz="886967">
+              <a:defRPr sz="2900"/>
             </a:lvl1pPr>
           </a:lstStyle>
           <a:p>
@@ -8431,7 +8406,7 @@
       </p:sp>
       <p:pic>
         <p:nvPicPr>
-          <p:cNvPr id="215" name="Image" descr="Image"/>
+          <p:cNvPr id="219" name="Image" descr="Image"/>
           <p:cNvPicPr>
             <a:picLocks noChangeAspect="1"/>
           </p:cNvPicPr>
@@ -8448,7 +8423,7 @@
         <p:spPr>
           <a:xfrm>
             <a:off x="4283771" y="1762254"/>
-            <a:ext cx="3312400" cy="1360450"/>
+            <a:ext cx="3312401" cy="1360451"/>
           </a:xfrm>
           <a:prstGeom prst="rect">
             <a:avLst/>
@@ -8460,14 +8435,14 @@
       </p:pic>
       <p:sp>
         <p:nvSpPr>
-          <p:cNvPr id="216" name="Let’s solve this system using Gaussian elimination…"/>
+          <p:cNvPr id="220" name="Let’s solve this system using Gaussian elimination…"/>
           <p:cNvSpPr txBox="1"/>
           <p:nvPr/>
         </p:nvSpPr>
         <p:spPr>
           <a:xfrm>
-            <a:off x="389408" y="1892300"/>
-            <a:ext cx="2713088" cy="863600"/>
+            <a:off x="389407" y="1892300"/>
+            <a:ext cx="2713090" cy="863600"/>
           </a:xfrm>
           <a:prstGeom prst="rect">
             <a:avLst/>
@@ -8487,13 +8462,27 @@
           </a:bodyPr>
           <a:lstStyle/>
           <a:p>
-            <a:pPr/>
+            <a:pPr>
+              <a:defRPr>
+                <a:latin typeface="+mj-lt"/>
+                <a:ea typeface="+mj-ea"/>
+                <a:cs typeface="+mj-cs"/>
+                <a:sym typeface="Helvetica"/>
+              </a:defRPr>
+            </a:pPr>
             <a:r>
               <a:t>Let’s solve this system using Gaussian elimination</a:t>
             </a:r>
           </a:p>
           <a:p>
-            <a:pPr/>
+            <a:pPr>
+              <a:defRPr>
+                <a:latin typeface="+mj-lt"/>
+                <a:ea typeface="+mj-ea"/>
+                <a:cs typeface="+mj-cs"/>
+                <a:sym typeface="Helvetica"/>
+              </a:defRPr>
+            </a:pPr>
             <a:r>
               <a:t>Be sure to follow along in your notes. Try to stay one step ahead!</a:t>
             </a:r>
@@ -8528,13 +8517,17 @@
       </p:grpSpPr>
       <p:sp>
         <p:nvSpPr>
-          <p:cNvPr id="220" name="mini-lesson"/>
+          <p:cNvPr id="224" name="mini-lesson"/>
           <p:cNvSpPr txBox="1"/>
           <p:nvPr>
             <p:ph type="title"/>
           </p:nvPr>
         </p:nvSpPr>
         <p:spPr>
+          <a:xfrm>
+            <a:off x="2400250" y="575950"/>
+            <a:ext cx="6321601" cy="635403"/>
+          </a:xfrm>
           <a:prstGeom prst="rect">
             <a:avLst/>
           </a:prstGeom>
@@ -8542,8 +8535,8 @@
         <p:txBody>
           <a:bodyPr/>
           <a:lstStyle>
-            <a:lvl1pPr defTabSz="886968">
-              <a:defRPr sz="2910"/>
+            <a:lvl1pPr defTabSz="886967">
+              <a:defRPr sz="2900"/>
             </a:lvl1pPr>
           </a:lstStyle>
           <a:p>
@@ -8556,7 +8549,7 @@
       </p:sp>
       <p:sp>
         <p:nvSpPr>
-          <p:cNvPr id="221" name="Use Gaussian elimination to solve the two systems below. Be sure to work on your own…"/>
+          <p:cNvPr id="225" name="Use Gaussian elimination to solve the two systems below. Be sure to work on your own…"/>
           <p:cNvSpPr txBox="1"/>
           <p:nvPr/>
         </p:nvSpPr>
@@ -8591,6 +8584,10 @@
                     <a:lumOff val="-10431"/>
                   </a:schemeClr>
                 </a:solidFill>
+                <a:latin typeface="+mj-lt"/>
+                <a:ea typeface="+mj-ea"/>
+                <a:cs typeface="+mj-cs"/>
+                <a:sym typeface="Helvetica"/>
               </a:defRPr>
             </a:pPr>
             <a:r>
@@ -8606,6 +8603,10 @@
                     <a:lumOff val="-10431"/>
                   </a:schemeClr>
                 </a:solidFill>
+                <a:latin typeface="+mj-lt"/>
+                <a:ea typeface="+mj-ea"/>
+                <a:cs typeface="+mj-cs"/>
+                <a:sym typeface="Helvetica"/>
               </a:defRPr>
             </a:pPr>
             <a:r>
@@ -8616,14 +8617,14 @@
       </p:sp>
       <p:sp>
         <p:nvSpPr>
-          <p:cNvPr id="222" name="Text"/>
+          <p:cNvPr id="226" name="Text"/>
           <p:cNvSpPr txBox="1"/>
           <p:nvPr/>
         </p:nvSpPr>
         <p:spPr>
           <a:xfrm>
-            <a:off x="1955703" y="1991178"/>
-            <a:ext cx="1170539" cy="449944"/>
+            <a:off x="1955702" y="1991178"/>
+            <a:ext cx="1407731" cy="522246"/>
           </a:xfrm>
           <a:prstGeom prst="rect">
             <a:avLst/>
@@ -8643,7 +8644,14 @@
           </a:bodyPr>
           <a:lstStyle/>
           <a:p>
-            <a:pPr/>
+            <a:pPr>
+              <a:defRPr sz="1700">
+                <a:latin typeface="Cambria Math"/>
+                <a:ea typeface="Cambria Math"/>
+                <a:cs typeface="Cambria Math"/>
+                <a:sym typeface="Cambria Math"/>
+              </a:defRPr>
+            </a:pPr>
             <a14:m>
               <m:oMathPara>
                 <m:oMathParaPr>
@@ -8651,7 +8659,7 @@
                 </m:oMathParaPr>
                 <m:oMath>
                   <m:r>
-                    <a:rPr xmlns:a="http://schemas.openxmlformats.org/drawingml/2006/main" sz="1700" i="1">
+                    <a:rPr xmlns:a="http://schemas.openxmlformats.org/drawingml/2006/main" sz="1800" i="1">
                       <a:solidFill>
                         <a:srgbClr val="F46524"/>
                       </a:solidFill>
@@ -8660,7 +8668,7 @@
                     <m:t>x</m:t>
                   </m:r>
                   <m:r>
-                    <a:rPr xmlns:a="http://schemas.openxmlformats.org/drawingml/2006/main" sz="1700" i="1">
+                    <a:rPr xmlns:a="http://schemas.openxmlformats.org/drawingml/2006/main" sz="1800" i="1">
                       <a:solidFill>
                         <a:srgbClr val="F46524"/>
                       </a:solidFill>
@@ -8669,7 +8677,7 @@
                     <m:t>-</m:t>
                   </m:r>
                   <m:r>
-                    <a:rPr xmlns:a="http://schemas.openxmlformats.org/drawingml/2006/main" sz="1700" i="1">
+                    <a:rPr xmlns:a="http://schemas.openxmlformats.org/drawingml/2006/main" sz="1800" i="1">
                       <a:solidFill>
                         <a:srgbClr val="F46524"/>
                       </a:solidFill>
@@ -8678,7 +8686,7 @@
                     <m:t>2</m:t>
                   </m:r>
                   <m:r>
-                    <a:rPr xmlns:a="http://schemas.openxmlformats.org/drawingml/2006/main" sz="1700" i="1">
+                    <a:rPr xmlns:a="http://schemas.openxmlformats.org/drawingml/2006/main" sz="1800" i="1">
                       <a:solidFill>
                         <a:srgbClr val="F46524"/>
                       </a:solidFill>
@@ -8687,7 +8695,7 @@
                     <m:t>y</m:t>
                   </m:r>
                   <m:r>
-                    <a:rPr xmlns:a="http://schemas.openxmlformats.org/drawingml/2006/main" sz="1700" i="1">
+                    <a:rPr xmlns:a="http://schemas.openxmlformats.org/drawingml/2006/main" sz="1800" i="1">
                       <a:solidFill>
                         <a:srgbClr val="F46524"/>
                       </a:solidFill>
@@ -8696,7 +8704,7 @@
                     <m:t>=</m:t>
                   </m:r>
                   <m:r>
-                    <a:rPr xmlns:a="http://schemas.openxmlformats.org/drawingml/2006/main" sz="1700" i="1">
+                    <a:rPr xmlns:a="http://schemas.openxmlformats.org/drawingml/2006/main" sz="1800" i="1">
                       <a:solidFill>
                         <a:srgbClr val="F46524"/>
                       </a:solidFill>
@@ -8707,9 +8715,22 @@
                 </m:oMath>
               </m:oMathPara>
             </a14:m>
-          </a:p>
-          <a:p>
-            <a:pPr/>
+            <a:endParaRPr>
+              <a:latin typeface="+mj-lt"/>
+              <a:ea typeface="+mj-ea"/>
+              <a:cs typeface="+mj-cs"/>
+              <a:sym typeface="Helvetica"/>
+            </a:endParaRPr>
+          </a:p>
+          <a:p>
+            <a:pPr>
+              <a:defRPr sz="1700">
+                <a:latin typeface="Cambria Math"/>
+                <a:ea typeface="Cambria Math"/>
+                <a:cs typeface="Cambria Math"/>
+                <a:sym typeface="Cambria Math"/>
+              </a:defRPr>
+            </a:pPr>
             <a14:m>
               <m:oMathPara>
                 <m:oMathParaPr>
@@ -8717,7 +8738,7 @@
                 </m:oMathParaPr>
                 <m:oMath>
                   <m:r>
-                    <a:rPr xmlns:a="http://schemas.openxmlformats.org/drawingml/2006/main" sz="1700" i="1">
+                    <a:rPr xmlns:a="http://schemas.openxmlformats.org/drawingml/2006/main" sz="2100" i="1">
                       <a:solidFill>
                         <a:srgbClr val="F46524"/>
                       </a:solidFill>
@@ -8726,7 +8747,7 @@
                     <m:t>3</m:t>
                   </m:r>
                   <m:r>
-                    <a:rPr xmlns:a="http://schemas.openxmlformats.org/drawingml/2006/main" sz="1700" i="1">
+                    <a:rPr xmlns:a="http://schemas.openxmlformats.org/drawingml/2006/main" sz="2100" i="1">
                       <a:solidFill>
                         <a:srgbClr val="F46524"/>
                       </a:solidFill>
@@ -8735,7 +8756,7 @@
                     <m:t>x</m:t>
                   </m:r>
                   <m:r>
-                    <a:rPr xmlns:a="http://schemas.openxmlformats.org/drawingml/2006/main" sz="1700" i="1">
+                    <a:rPr xmlns:a="http://schemas.openxmlformats.org/drawingml/2006/main" sz="2100" i="1">
                       <a:solidFill>
                         <a:srgbClr val="F46524"/>
                       </a:solidFill>
@@ -8744,7 +8765,7 @@
                     <m:t>-</m:t>
                   </m:r>
                   <m:r>
-                    <a:rPr xmlns:a="http://schemas.openxmlformats.org/drawingml/2006/main" sz="1700" i="1">
+                    <a:rPr xmlns:a="http://schemas.openxmlformats.org/drawingml/2006/main" sz="2100" i="1">
                       <a:solidFill>
                         <a:srgbClr val="F46524"/>
                       </a:solidFill>
@@ -8753,7 +8774,7 @@
                     <m:t>6</m:t>
                   </m:r>
                   <m:r>
-                    <a:rPr xmlns:a="http://schemas.openxmlformats.org/drawingml/2006/main" sz="1700" i="1">
+                    <a:rPr xmlns:a="http://schemas.openxmlformats.org/drawingml/2006/main" sz="2100" i="1">
                       <a:solidFill>
                         <a:srgbClr val="F46524"/>
                       </a:solidFill>
@@ -8762,7 +8783,7 @@
                     <m:t>y</m:t>
                   </m:r>
                   <m:r>
-                    <a:rPr xmlns:a="http://schemas.openxmlformats.org/drawingml/2006/main" sz="1700" i="1">
+                    <a:rPr xmlns:a="http://schemas.openxmlformats.org/drawingml/2006/main" sz="2100" i="1">
                       <a:solidFill>
                         <a:srgbClr val="F46524"/>
                       </a:solidFill>
@@ -8771,7 +8792,7 @@
                     <m:t>=</m:t>
                   </m:r>
                   <m:r>
-                    <a:rPr xmlns:a="http://schemas.openxmlformats.org/drawingml/2006/main" sz="1700" i="1">
+                    <a:rPr xmlns:a="http://schemas.openxmlformats.org/drawingml/2006/main" sz="2100" i="1">
                       <a:solidFill>
                         <a:srgbClr val="F46524"/>
                       </a:solidFill>
@@ -8787,14 +8808,14 @@
       </p:sp>
       <p:sp>
         <p:nvSpPr>
-          <p:cNvPr id="223" name="a."/>
+          <p:cNvPr id="227" name="a."/>
           <p:cNvSpPr txBox="1"/>
           <p:nvPr/>
         </p:nvSpPr>
         <p:spPr>
           <a:xfrm>
             <a:off x="1595908" y="2006600"/>
-            <a:ext cx="160984" cy="215900"/>
+            <a:ext cx="160983" cy="215900"/>
           </a:xfrm>
           <a:prstGeom prst="rect">
             <a:avLst/>
@@ -8812,7 +8833,16 @@
           <a:bodyPr wrap="none" lIns="0" tIns="0" rIns="0" bIns="0">
             <a:spAutoFit/>
           </a:bodyPr>
-          <a:lstStyle/>
+          <a:lstStyle>
+            <a:lvl1pPr>
+              <a:defRPr>
+                <a:latin typeface="+mj-lt"/>
+                <a:ea typeface="+mj-ea"/>
+                <a:cs typeface="+mj-cs"/>
+                <a:sym typeface="Helvetica"/>
+              </a:defRPr>
+            </a:lvl1pPr>
+          </a:lstStyle>
           <a:p>
             <a:pPr/>
             <a:r>
@@ -8823,14 +8853,14 @@
       </p:sp>
       <p:sp>
         <p:nvSpPr>
-          <p:cNvPr id="224" name="b."/>
+          <p:cNvPr id="228" name="b."/>
           <p:cNvSpPr txBox="1"/>
           <p:nvPr/>
         </p:nvSpPr>
         <p:spPr>
           <a:xfrm>
             <a:off x="1595908" y="2991103"/>
-            <a:ext cx="160984" cy="215901"/>
+            <a:ext cx="160983" cy="215901"/>
           </a:xfrm>
           <a:prstGeom prst="rect">
             <a:avLst/>
@@ -8848,7 +8878,16 @@
           <a:bodyPr wrap="none" lIns="0" tIns="0" rIns="0" bIns="0">
             <a:spAutoFit/>
           </a:bodyPr>
-          <a:lstStyle/>
+          <a:lstStyle>
+            <a:lvl1pPr>
+              <a:defRPr>
+                <a:latin typeface="+mj-lt"/>
+                <a:ea typeface="+mj-ea"/>
+                <a:cs typeface="+mj-cs"/>
+                <a:sym typeface="Helvetica"/>
+              </a:defRPr>
+            </a:lvl1pPr>
+          </a:lstStyle>
           <a:p>
             <a:pPr/>
             <a:r>
@@ -8859,14 +8898,14 @@
       </p:sp>
       <p:sp>
         <p:nvSpPr>
-          <p:cNvPr id="225" name="Text"/>
+          <p:cNvPr id="229" name="Text"/>
           <p:cNvSpPr txBox="1"/>
           <p:nvPr/>
         </p:nvSpPr>
         <p:spPr>
           <a:xfrm>
-            <a:off x="2010014" y="2991103"/>
-            <a:ext cx="1061918" cy="449944"/>
+            <a:off x="2010013" y="2991103"/>
+            <a:ext cx="1275833" cy="522246"/>
           </a:xfrm>
           <a:prstGeom prst="rect">
             <a:avLst/>
@@ -8886,7 +8925,14 @@
           </a:bodyPr>
           <a:lstStyle/>
           <a:p>
-            <a:pPr/>
+            <a:pPr>
+              <a:defRPr sz="1700">
+                <a:latin typeface="Cambria Math"/>
+                <a:ea typeface="Cambria Math"/>
+                <a:cs typeface="Cambria Math"/>
+                <a:sym typeface="Cambria Math"/>
+              </a:defRPr>
+            </a:pPr>
             <a14:m>
               <m:oMathPara>
                 <m:oMathParaPr>
@@ -8894,7 +8940,7 @@
                 </m:oMathParaPr>
                 <m:oMath>
                   <m:r>
-                    <a:rPr xmlns:a="http://schemas.openxmlformats.org/drawingml/2006/main" sz="1700" i="1">
+                    <a:rPr xmlns:a="http://schemas.openxmlformats.org/drawingml/2006/main" sz="1800" i="1">
                       <a:solidFill>
                         <a:srgbClr val="F46524"/>
                       </a:solidFill>
@@ -8903,7 +8949,7 @@
                     <m:t>x</m:t>
                   </m:r>
                   <m:r>
-                    <a:rPr xmlns:a="http://schemas.openxmlformats.org/drawingml/2006/main" sz="1700" i="1">
+                    <a:rPr xmlns:a="http://schemas.openxmlformats.org/drawingml/2006/main" sz="1800" i="1">
                       <a:solidFill>
                         <a:srgbClr val="F46524"/>
                       </a:solidFill>
@@ -8912,7 +8958,7 @@
                     <m:t>-</m:t>
                   </m:r>
                   <m:r>
-                    <a:rPr xmlns:a="http://schemas.openxmlformats.org/drawingml/2006/main" sz="1700" i="1">
+                    <a:rPr xmlns:a="http://schemas.openxmlformats.org/drawingml/2006/main" sz="1800" i="1">
                       <a:solidFill>
                         <a:srgbClr val="F46524"/>
                       </a:solidFill>
@@ -8921,7 +8967,7 @@
                     <m:t>2</m:t>
                   </m:r>
                   <m:r>
-                    <a:rPr xmlns:a="http://schemas.openxmlformats.org/drawingml/2006/main" sz="1700" i="1">
+                    <a:rPr xmlns:a="http://schemas.openxmlformats.org/drawingml/2006/main" sz="1800" i="1">
                       <a:solidFill>
                         <a:srgbClr val="F46524"/>
                       </a:solidFill>
@@ -8930,7 +8976,7 @@
                     <m:t>y</m:t>
                   </m:r>
                   <m:r>
-                    <a:rPr xmlns:a="http://schemas.openxmlformats.org/drawingml/2006/main" sz="1700" i="1">
+                    <a:rPr xmlns:a="http://schemas.openxmlformats.org/drawingml/2006/main" sz="1800" i="1">
                       <a:solidFill>
                         <a:srgbClr val="F46524"/>
                       </a:solidFill>
@@ -8939,7 +8985,7 @@
                     <m:t>=</m:t>
                   </m:r>
                   <m:r>
-                    <a:rPr xmlns:a="http://schemas.openxmlformats.org/drawingml/2006/main" sz="1700" i="1">
+                    <a:rPr xmlns:a="http://schemas.openxmlformats.org/drawingml/2006/main" sz="1800" i="1">
                       <a:solidFill>
                         <a:srgbClr val="F46524"/>
                       </a:solidFill>
@@ -8950,9 +8996,22 @@
                 </m:oMath>
               </m:oMathPara>
             </a14:m>
-          </a:p>
-          <a:p>
-            <a:pPr/>
+            <a:endParaRPr>
+              <a:latin typeface="+mj-lt"/>
+              <a:ea typeface="+mj-ea"/>
+              <a:cs typeface="+mj-cs"/>
+              <a:sym typeface="Helvetica"/>
+            </a:endParaRPr>
+          </a:p>
+          <a:p>
+            <a:pPr>
+              <a:defRPr sz="1700">
+                <a:latin typeface="Cambria Math"/>
+                <a:ea typeface="Cambria Math"/>
+                <a:cs typeface="Cambria Math"/>
+                <a:sym typeface="Cambria Math"/>
+              </a:defRPr>
+            </a:pPr>
             <a14:m>
               <m:oMathPara>
                 <m:oMathParaPr>
@@ -8960,7 +9019,7 @@
                 </m:oMathParaPr>
                 <m:oMath>
                   <m:r>
-                    <a:rPr xmlns:a="http://schemas.openxmlformats.org/drawingml/2006/main" sz="1700" i="1">
+                    <a:rPr xmlns:a="http://schemas.openxmlformats.org/drawingml/2006/main" sz="2100" i="1">
                       <a:solidFill>
                         <a:srgbClr val="F46524"/>
                       </a:solidFill>
@@ -8969,7 +9028,7 @@
                     <m:t>3</m:t>
                   </m:r>
                   <m:r>
-                    <a:rPr xmlns:a="http://schemas.openxmlformats.org/drawingml/2006/main" sz="1700" i="1">
+                    <a:rPr xmlns:a="http://schemas.openxmlformats.org/drawingml/2006/main" sz="2100" i="1">
                       <a:solidFill>
                         <a:srgbClr val="F46524"/>
                       </a:solidFill>
@@ -8978,7 +9037,7 @@
                     <m:t>x</m:t>
                   </m:r>
                   <m:r>
-                    <a:rPr xmlns:a="http://schemas.openxmlformats.org/drawingml/2006/main" sz="1700" i="1">
+                    <a:rPr xmlns:a="http://schemas.openxmlformats.org/drawingml/2006/main" sz="2100" i="1">
                       <a:solidFill>
                         <a:srgbClr val="F46524"/>
                       </a:solidFill>
@@ -8987,7 +9046,7 @@
                     <m:t>-</m:t>
                   </m:r>
                   <m:r>
-                    <a:rPr xmlns:a="http://schemas.openxmlformats.org/drawingml/2006/main" sz="1700" i="1">
+                    <a:rPr xmlns:a="http://schemas.openxmlformats.org/drawingml/2006/main" sz="2100" i="1">
                       <a:solidFill>
                         <a:srgbClr val="F46524"/>
                       </a:solidFill>
@@ -8996,7 +9055,7 @@
                     <m:t>6</m:t>
                   </m:r>
                   <m:r>
-                    <a:rPr xmlns:a="http://schemas.openxmlformats.org/drawingml/2006/main" sz="1700" i="1">
+                    <a:rPr xmlns:a="http://schemas.openxmlformats.org/drawingml/2006/main" sz="2100" i="1">
                       <a:solidFill>
                         <a:srgbClr val="F46524"/>
                       </a:solidFill>
@@ -9005,7 +9064,7 @@
                     <m:t>y</m:t>
                   </m:r>
                   <m:r>
-                    <a:rPr xmlns:a="http://schemas.openxmlformats.org/drawingml/2006/main" sz="1700" i="1">
+                    <a:rPr xmlns:a="http://schemas.openxmlformats.org/drawingml/2006/main" sz="2100" i="1">
                       <a:solidFill>
                         <a:srgbClr val="F46524"/>
                       </a:solidFill>
@@ -9014,7 +9073,7 @@
                     <m:t>=</m:t>
                   </m:r>
                   <m:r>
-                    <a:rPr xmlns:a="http://schemas.openxmlformats.org/drawingml/2006/main" sz="1700" i="1">
+                    <a:rPr xmlns:a="http://schemas.openxmlformats.org/drawingml/2006/main" sz="2100" i="1">
                       <a:solidFill>
                         <a:srgbClr val="F46524"/>
                       </a:solidFill>
@@ -9030,7 +9089,7 @@
       </p:sp>
       <p:pic>
         <p:nvPicPr>
-          <p:cNvPr id="226" name="Image" descr="Image"/>
+          <p:cNvPr id="230" name="Image" descr="Image"/>
           <p:cNvPicPr>
             <a:picLocks noChangeAspect="1"/>
           </p:cNvPicPr>
@@ -9046,8 +9105,8 @@
         </p:blipFill>
         <p:spPr>
           <a:xfrm>
-            <a:off x="4647714" y="2097140"/>
-            <a:ext cx="2912230" cy="2003828"/>
+            <a:off x="4647713" y="2097140"/>
+            <a:ext cx="2912231" cy="2003829"/>
           </a:xfrm>
           <a:prstGeom prst="rect">
             <a:avLst/>
@@ -9096,7 +9155,7 @@
                                       <p:cBhvr>
                                         <p:cTn id="6" fill="hold"/>
                                         <p:tgtEl>
-                                          <p:spTgt spid="222"/>
+                                          <p:spTgt spid="226"/>
                                         </p:tgtEl>
                                         <p:attrNameLst>
                                           <p:attrName>style.visibility</p:attrName>
@@ -9140,7 +9199,7 @@
                                       <p:cBhvr>
                                         <p:cTn id="10" fill="hold"/>
                                         <p:tgtEl>
-                                          <p:spTgt spid="225"/>
+                                          <p:spTgt spid="229"/>
                                         </p:tgtEl>
                                         <p:attrNameLst>
                                           <p:attrName>style.visibility</p:attrName>
@@ -9184,7 +9243,7 @@
                                       <p:cBhvr>
                                         <p:cTn id="14" fill="hold"/>
                                         <p:tgtEl>
-                                          <p:spTgt spid="226"/>
+                                          <p:spTgt spid="230"/>
                                         </p:tgtEl>
                                         <p:attrNameLst>
                                           <p:attrName>style.visibility</p:attrName>
@@ -9225,9 +9284,9 @@
       </p:par>
     </p:tnLst>
     <p:bldLst>
-      <p:bldP build="whole" bldLvl="1" animBg="1" rev="0" advAuto="0" spid="226" grpId="3"/>
-      <p:bldP build="whole" bldLvl="1" animBg="1" rev="0" advAuto="0" spid="222" grpId="1"/>
-      <p:bldP build="whole" bldLvl="1" animBg="1" rev="0" advAuto="0" spid="225" grpId="2"/>
+      <p:bldP build="whole" bldLvl="1" animBg="1" rev="0" advAuto="0" spid="226" grpId="1"/>
+      <p:bldP build="whole" bldLvl="1" animBg="1" rev="0" advAuto="0" spid="229" grpId="2"/>
+      <p:bldP build="whole" bldLvl="1" animBg="1" rev="0" advAuto="0" spid="230" grpId="3"/>
     </p:bldLst>
   </p:timing>
 </p:sld>
@@ -9252,13 +9311,17 @@
       </p:grpSpPr>
       <p:sp>
         <p:nvSpPr>
-          <p:cNvPr id="230" name="mini-lesson"/>
+          <p:cNvPr id="234" name="mini-lesson"/>
           <p:cNvSpPr txBox="1"/>
           <p:nvPr>
             <p:ph type="title"/>
           </p:nvPr>
         </p:nvSpPr>
         <p:spPr>
+          <a:xfrm>
+            <a:off x="2400250" y="575950"/>
+            <a:ext cx="6321601" cy="635403"/>
+          </a:xfrm>
           <a:prstGeom prst="rect">
             <a:avLst/>
           </a:prstGeom>
@@ -9266,8 +9329,8 @@
         <p:txBody>
           <a:bodyPr/>
           <a:lstStyle>
-            <a:lvl1pPr defTabSz="886968">
-              <a:defRPr sz="2910"/>
+            <a:lvl1pPr defTabSz="886967">
+              <a:defRPr sz="2900"/>
             </a:lvl1pPr>
           </a:lstStyle>
           <a:p>
@@ -9280,14 +9343,14 @@
       </p:sp>
       <p:sp>
         <p:nvSpPr>
-          <p:cNvPr id="231" name="With a partner, try to solve this systems using Gaussian elimination:"/>
+          <p:cNvPr id="235" name="With a partner, try to solve this systems using Gaussian elimination:"/>
           <p:cNvSpPr txBox="1"/>
           <p:nvPr/>
         </p:nvSpPr>
         <p:spPr>
           <a:xfrm>
             <a:off x="4769568" y="1019876"/>
-            <a:ext cx="3844564" cy="431801"/>
+            <a:ext cx="3844565" cy="431801"/>
           </a:xfrm>
           <a:prstGeom prst="rect">
             <a:avLst/>
@@ -9314,6 +9377,10 @@
                     <a:lumOff val="-10431"/>
                   </a:schemeClr>
                 </a:solidFill>
+                <a:latin typeface="+mj-lt"/>
+                <a:ea typeface="+mj-ea"/>
+                <a:cs typeface="+mj-cs"/>
+                <a:sym typeface="Helvetica"/>
               </a:defRPr>
             </a:lvl1pPr>
           </a:lstStyle>
@@ -9327,14 +9394,14 @@
       </p:sp>
       <p:sp>
         <p:nvSpPr>
-          <p:cNvPr id="232" name="Exchange equations…"/>
+          <p:cNvPr id="236" name="Exchange equations…"/>
           <p:cNvSpPr txBox="1"/>
           <p:nvPr/>
         </p:nvSpPr>
         <p:spPr>
           <a:xfrm>
-            <a:off x="557242" y="1841953"/>
-            <a:ext cx="2837107" cy="1079501"/>
+            <a:off x="557241" y="1841953"/>
+            <a:ext cx="2837109" cy="1079501"/>
           </a:xfrm>
           <a:prstGeom prst="rect">
             <a:avLst/>
@@ -9354,7 +9421,7 @@
           </a:bodyPr>
           <a:lstStyle/>
           <a:p>
-            <a:pPr marL="187157" indent="-187157">
+            <a:pPr marL="187156" indent="-187156">
               <a:buSzPct val="100000"/>
               <a:buAutoNum type="arabicPeriod" startAt="1"/>
               <a:defRPr>
@@ -9363,6 +9430,10 @@
                     <a:lumOff val="-9098"/>
                   </a:schemeClr>
                 </a:solidFill>
+                <a:latin typeface="+mj-lt"/>
+                <a:ea typeface="+mj-ea"/>
+                <a:cs typeface="+mj-cs"/>
+                <a:sym typeface="Helvetica"/>
               </a:defRPr>
             </a:pPr>
             <a:r>
@@ -9370,7 +9441,7 @@
             </a:r>
           </a:p>
           <a:p>
-            <a:pPr marL="187157" indent="-187157">
+            <a:pPr marL="187156" indent="-187156">
               <a:buSzPct val="100000"/>
               <a:buAutoNum type="arabicPeriod" startAt="1"/>
               <a:defRPr>
@@ -9379,6 +9450,10 @@
                     <a:lumOff val="-9098"/>
                   </a:schemeClr>
                 </a:solidFill>
+                <a:latin typeface="+mj-lt"/>
+                <a:ea typeface="+mj-ea"/>
+                <a:cs typeface="+mj-cs"/>
+                <a:sym typeface="Helvetica"/>
               </a:defRPr>
             </a:pPr>
             <a:r>
@@ -9386,7 +9461,7 @@
             </a:r>
           </a:p>
           <a:p>
-            <a:pPr marL="187157" indent="-187157">
+            <a:pPr marL="187156" indent="-187156">
               <a:buSzPct val="100000"/>
               <a:buAutoNum type="arabicPeriod" startAt="1"/>
               <a:defRPr>
@@ -9395,6 +9470,10 @@
                     <a:lumOff val="-9098"/>
                   </a:schemeClr>
                 </a:solidFill>
+                <a:latin typeface="+mj-lt"/>
+                <a:ea typeface="+mj-ea"/>
+                <a:cs typeface="+mj-cs"/>
+                <a:sym typeface="Helvetica"/>
               </a:defRPr>
             </a:pPr>
             <a:r>
@@ -9405,14 +9484,14 @@
       </p:sp>
       <p:sp>
         <p:nvSpPr>
-          <p:cNvPr id="233" name="Row operations"/>
+          <p:cNvPr id="237" name="Row operations"/>
           <p:cNvSpPr txBox="1"/>
           <p:nvPr/>
         </p:nvSpPr>
         <p:spPr>
           <a:xfrm>
-            <a:off x="646839" y="1551437"/>
-            <a:ext cx="1248099" cy="215901"/>
+            <a:off x="646839" y="1551436"/>
+            <a:ext cx="1248098" cy="215901"/>
           </a:xfrm>
           <a:prstGeom prst="rect">
             <a:avLst/>
@@ -9430,7 +9509,16 @@
           <a:bodyPr wrap="none" lIns="0" tIns="0" rIns="0" bIns="0">
             <a:spAutoFit/>
           </a:bodyPr>
-          <a:lstStyle/>
+          <a:lstStyle>
+            <a:lvl1pPr>
+              <a:defRPr>
+                <a:latin typeface="+mj-lt"/>
+                <a:ea typeface="+mj-ea"/>
+                <a:cs typeface="+mj-cs"/>
+                <a:sym typeface="Helvetica"/>
+              </a:defRPr>
+            </a:lvl1pPr>
+          </a:lstStyle>
           <a:p>
             <a:pPr/>
             <a:r>
@@ -9441,7 +9529,7 @@
       </p:sp>
       <p:pic>
         <p:nvPicPr>
-          <p:cNvPr id="234" name="Image" descr="Image"/>
+          <p:cNvPr id="238" name="Image" descr="Image"/>
           <p:cNvPicPr>
             <a:picLocks noChangeAspect="1"/>
           </p:cNvPicPr>
@@ -9458,8 +9546,8 @@
         </p:blipFill>
         <p:spPr>
           <a:xfrm>
-            <a:off x="4408095" y="2036853"/>
-            <a:ext cx="2503951" cy="1079400"/>
+            <a:off x="4408094" y="2036852"/>
+            <a:ext cx="2503952" cy="1079402"/>
           </a:xfrm>
           <a:prstGeom prst="rect">
             <a:avLst/>
@@ -9508,7 +9596,7 @@
                                       <p:cBhvr>
                                         <p:cTn id="6" fill="hold"/>
                                         <p:tgtEl>
-                                          <p:spTgt spid="232">
+                                          <p:spTgt spid="236">
                                             <p:bg/>
                                           </p:spTgt>
                                         </p:tgtEl>
@@ -9536,7 +9624,7 @@
                                       <p:cBhvr>
                                         <p:cTn id="8" fill="hold"/>
                                         <p:tgtEl>
-                                          <p:spTgt spid="232">
+                                          <p:spTgt spid="236">
                                             <p:txEl>
                                               <p:pRg st="0" end="0"/>
                                             </p:txEl>
@@ -9556,23 +9644,14 @@
                             </p:childTnLst>
                           </p:cTn>
                         </p:par>
-                      </p:childTnLst>
-                    </p:cTn>
-                  </p:par>
-                  <p:par>
-                    <p:cTn id="9" fill="hold">
-                      <p:stCondLst>
-                        <p:cond delay="indefinite"/>
-                      </p:stCondLst>
-                      <p:childTnLst>
                         <p:par>
-                          <p:cTn id="10" fill="hold">
+                          <p:cTn id="9" fill="hold">
                             <p:stCondLst>
                               <p:cond delay="0"/>
                             </p:stCondLst>
                             <p:childTnLst>
                               <p:par>
-                                <p:cTn id="11" presetClass="entr" nodeType="clickEffect" presetSubtype="0" presetID="1" grpId="1" fill="hold">
+                                <p:cTn id="10" presetClass="entr" nodeType="afterEffect" presetSubtype="0" presetID="1" grpId="1" fill="hold">
                                   <p:stCondLst>
                                     <p:cond delay="0"/>
                                   </p:stCondLst>
@@ -9582,9 +9661,9 @@
                                   <p:childTnLst>
                                     <p:set>
                                       <p:cBhvr>
-                                        <p:cTn id="12" fill="hold"/>
+                                        <p:cTn id="11" fill="hold"/>
                                         <p:tgtEl>
-                                          <p:spTgt spid="232">
+                                          <p:spTgt spid="236">
                                             <p:txEl>
                                               <p:pRg st="1" end="1"/>
                                             </p:txEl>
@@ -9608,19 +9687,19 @@
                     </p:cTn>
                   </p:par>
                   <p:par>
-                    <p:cTn id="13" fill="hold">
+                    <p:cTn id="12" fill="hold">
                       <p:stCondLst>
                         <p:cond delay="indefinite"/>
                       </p:stCondLst>
                       <p:childTnLst>
                         <p:par>
-                          <p:cTn id="14" fill="hold">
+                          <p:cTn id="13" fill="hold">
                             <p:stCondLst>
                               <p:cond delay="0"/>
                             </p:stCondLst>
                             <p:childTnLst>
                               <p:par>
-                                <p:cTn id="15" presetClass="entr" nodeType="clickEffect" presetSubtype="0" presetID="1" grpId="1" fill="hold">
+                                <p:cTn id="14" presetClass="entr" nodeType="clickEffect" presetSubtype="0" presetID="1" grpId="1" fill="hold">
                                   <p:stCondLst>
                                     <p:cond delay="0"/>
                                   </p:stCondLst>
@@ -9630,9 +9709,9 @@
                                   <p:childTnLst>
                                     <p:set>
                                       <p:cBhvr>
-                                        <p:cTn id="16" fill="hold"/>
+                                        <p:cTn id="15" fill="hold"/>
                                         <p:tgtEl>
-                                          <p:spTgt spid="232">
+                                          <p:spTgt spid="236">
                                             <p:txEl>
                                               <p:pRg st="2" end="2"/>
                                             </p:txEl>
@@ -9677,7 +9756,7 @@
       </p:par>
     </p:tnLst>
     <p:bldLst>
-      <p:bldP build="p" bldLvl="5" animBg="1" rev="0" advAuto="0" spid="232" grpId="1"/>
+      <p:bldP build="p" bldLvl="5" animBg="1" rev="0" advAuto="0" spid="236" grpId="1"/>
     </p:bldLst>
   </p:timing>
 </p:sld>
@@ -9914,10 +9993,10 @@
             </a:solidFill>
             <a:effectLst/>
             <a:uFillTx/>
-            <a:latin typeface="+mj-lt"/>
-            <a:ea typeface="+mj-ea"/>
-            <a:cs typeface="+mj-cs"/>
-            <a:sym typeface="Helvetica"/>
+            <a:latin typeface="+mn-lt"/>
+            <a:ea typeface="+mn-ea"/>
+            <a:cs typeface="+mn-cs"/>
+            <a:sym typeface="Arial"/>
           </a:defRPr>
         </a:defPPr>
         <a:lvl1pPr marL="0" marR="0" indent="0" algn="l" defTabSz="914400" rtl="0" fontAlgn="auto" latinLnBrk="1" hangingPunct="0">
@@ -10485,10 +10564,10 @@
             </a:solidFill>
             <a:effectLst/>
             <a:uFillTx/>
-            <a:latin typeface="+mj-lt"/>
-            <a:ea typeface="+mj-ea"/>
-            <a:cs typeface="+mj-cs"/>
-            <a:sym typeface="Helvetica"/>
+            <a:latin typeface="+mn-lt"/>
+            <a:ea typeface="+mn-ea"/>
+            <a:cs typeface="+mn-cs"/>
+            <a:sym typeface="Arial"/>
           </a:defRPr>
         </a:defPPr>
         <a:lvl1pPr marL="0" marR="0" indent="0" algn="l" defTabSz="914400" rtl="0" fontAlgn="auto" latinLnBrk="1" hangingPunct="0">
@@ -10968,10 +11047,10 @@
             </a:solidFill>
             <a:effectLst/>
             <a:uFillTx/>
-            <a:latin typeface="+mj-lt"/>
-            <a:ea typeface="+mj-ea"/>
-            <a:cs typeface="+mj-cs"/>
-            <a:sym typeface="Helvetica"/>
+            <a:latin typeface="+mn-lt"/>
+            <a:ea typeface="+mn-ea"/>
+            <a:cs typeface="+mn-cs"/>
+            <a:sym typeface="Arial"/>
           </a:defRPr>
         </a:defPPr>
         <a:lvl1pPr marL="0" marR="0" indent="0" algn="l" defTabSz="914400" rtl="0" fontAlgn="auto" latinLnBrk="1" hangingPunct="0">
@@ -11539,10 +11618,10 @@
             </a:solidFill>
             <a:effectLst/>
             <a:uFillTx/>
-            <a:latin typeface="+mj-lt"/>
-            <a:ea typeface="+mj-ea"/>
-            <a:cs typeface="+mj-cs"/>
-            <a:sym typeface="Helvetica"/>
+            <a:latin typeface="+mn-lt"/>
+            <a:ea typeface="+mn-ea"/>
+            <a:cs typeface="+mn-cs"/>
+            <a:sym typeface="Arial"/>
           </a:defRPr>
         </a:defPPr>
         <a:lvl1pPr marL="0" marR="0" indent="0" algn="l" defTabSz="914400" rtl="0" fontAlgn="auto" latinLnBrk="1" hangingPunct="0">

</xml_diff>